<commit_message>
Added text to logo ; Corrected a pandas deprecation in dbinterface.
</commit_message>
<xml_diff>
--- a/logo.pptx
+++ b/logo.pptx
@@ -259,7 +259,7 @@
           <a:p>
             <a:fld id="{2DA01E9C-F9D9-044C-977D-997D3E353488}" type="datetimeFigureOut">
               <a:rPr lang="en-US" smtClean="0"/>
-              <a:t>6/1/20</a:t>
+              <a:t>8/5/20</a:t>
             </a:fld>
             <a:endParaRPr lang="en-US"/>
           </a:p>
@@ -457,7 +457,7 @@
           <a:p>
             <a:fld id="{2DA01E9C-F9D9-044C-977D-997D3E353488}" type="datetimeFigureOut">
               <a:rPr lang="en-US" smtClean="0"/>
-              <a:t>6/1/20</a:t>
+              <a:t>8/5/20</a:t>
             </a:fld>
             <a:endParaRPr lang="en-US"/>
           </a:p>
@@ -665,7 +665,7 @@
           <a:p>
             <a:fld id="{2DA01E9C-F9D9-044C-977D-997D3E353488}" type="datetimeFigureOut">
               <a:rPr lang="en-US" smtClean="0"/>
-              <a:t>6/1/20</a:t>
+              <a:t>8/5/20</a:t>
             </a:fld>
             <a:endParaRPr lang="en-US"/>
           </a:p>
@@ -863,7 +863,7 @@
           <a:p>
             <a:fld id="{2DA01E9C-F9D9-044C-977D-997D3E353488}" type="datetimeFigureOut">
               <a:rPr lang="en-US" smtClean="0"/>
-              <a:t>6/1/20</a:t>
+              <a:t>8/5/20</a:t>
             </a:fld>
             <a:endParaRPr lang="en-US"/>
           </a:p>
@@ -1138,7 +1138,7 @@
           <a:p>
             <a:fld id="{2DA01E9C-F9D9-044C-977D-997D3E353488}" type="datetimeFigureOut">
               <a:rPr lang="en-US" smtClean="0"/>
-              <a:t>6/1/20</a:t>
+              <a:t>8/5/20</a:t>
             </a:fld>
             <a:endParaRPr lang="en-US"/>
           </a:p>
@@ -1403,7 +1403,7 @@
           <a:p>
             <a:fld id="{2DA01E9C-F9D9-044C-977D-997D3E353488}" type="datetimeFigureOut">
               <a:rPr lang="en-US" smtClean="0"/>
-              <a:t>6/1/20</a:t>
+              <a:t>8/5/20</a:t>
             </a:fld>
             <a:endParaRPr lang="en-US"/>
           </a:p>
@@ -1815,7 +1815,7 @@
           <a:p>
             <a:fld id="{2DA01E9C-F9D9-044C-977D-997D3E353488}" type="datetimeFigureOut">
               <a:rPr lang="en-US" smtClean="0"/>
-              <a:t>6/1/20</a:t>
+              <a:t>8/5/20</a:t>
             </a:fld>
             <a:endParaRPr lang="en-US"/>
           </a:p>
@@ -1956,7 +1956,7 @@
           <a:p>
             <a:fld id="{2DA01E9C-F9D9-044C-977D-997D3E353488}" type="datetimeFigureOut">
               <a:rPr lang="en-US" smtClean="0"/>
-              <a:t>6/1/20</a:t>
+              <a:t>8/5/20</a:t>
             </a:fld>
             <a:endParaRPr lang="en-US"/>
           </a:p>
@@ -2069,7 +2069,7 @@
           <a:p>
             <a:fld id="{2DA01E9C-F9D9-044C-977D-997D3E353488}" type="datetimeFigureOut">
               <a:rPr lang="en-US" smtClean="0"/>
-              <a:t>6/1/20</a:t>
+              <a:t>8/5/20</a:t>
             </a:fld>
             <a:endParaRPr lang="en-US"/>
           </a:p>
@@ -2380,7 +2380,7 @@
           <a:p>
             <a:fld id="{2DA01E9C-F9D9-044C-977D-997D3E353488}" type="datetimeFigureOut">
               <a:rPr lang="en-US" smtClean="0"/>
-              <a:t>6/1/20</a:t>
+              <a:t>8/5/20</a:t>
             </a:fld>
             <a:endParaRPr lang="en-US"/>
           </a:p>
@@ -2668,7 +2668,7 @@
           <a:p>
             <a:fld id="{2DA01E9C-F9D9-044C-977D-997D3E353488}" type="datetimeFigureOut">
               <a:rPr lang="en-US" smtClean="0"/>
-              <a:t>6/1/20</a:t>
+              <a:t>8/5/20</a:t>
             </a:fld>
             <a:endParaRPr lang="en-US"/>
           </a:p>
@@ -2909,7 +2909,7 @@
           <a:p>
             <a:fld id="{2DA01E9C-F9D9-044C-977D-997D3E353488}" type="datetimeFigureOut">
               <a:rPr lang="en-US" smtClean="0"/>
-              <a:t>6/1/20</a:t>
+              <a:t>8/5/20</a:t>
             </a:fld>
             <a:endParaRPr lang="en-US"/>
           </a:p>
@@ -3340,7 +3340,7 @@
         </p:nvSpPr>
         <p:spPr>
           <a:xfrm>
-            <a:off x="5375188" y="2213565"/>
+            <a:off x="6833875" y="1924884"/>
             <a:ext cx="1112110" cy="752058"/>
           </a:xfrm>
           <a:prstGeom prst="parallelogram">
@@ -3394,7 +3394,7 @@
         </p:nvSpPr>
         <p:spPr>
           <a:xfrm flipV="1">
-            <a:off x="5375188" y="2965623"/>
+            <a:off x="6844385" y="2676942"/>
             <a:ext cx="1112110" cy="752058"/>
           </a:xfrm>
           <a:prstGeom prst="parallelogram">
@@ -3445,7 +3445,7 @@
         </p:nvSpPr>
         <p:spPr>
           <a:xfrm>
-            <a:off x="4942704" y="1534120"/>
+            <a:off x="6401391" y="1245439"/>
             <a:ext cx="432484" cy="2183561"/>
           </a:xfrm>
           <a:prstGeom prst="rect">
@@ -3520,7 +3520,7 @@
         </p:blipFill>
         <p:spPr>
           <a:xfrm>
-            <a:off x="7514896" y="577301"/>
+            <a:off x="-986638" y="1799981"/>
             <a:ext cx="3657600" cy="3835400"/>
           </a:xfrm>
           <a:prstGeom prst="rect">
@@ -3528,6 +3528,47 @@
           </a:prstGeom>
         </p:spPr>
       </p:pic>
+      <p:sp>
+        <p:nvSpPr>
+          <p:cNvPr id="2" name="TextBox 1">
+            <a:extLst>
+              <a:ext uri="{FF2B5EF4-FFF2-40B4-BE49-F238E27FC236}">
+                <a16:creationId xmlns:a16="http://schemas.microsoft.com/office/drawing/2014/main" id="{DA28ED80-1720-D247-8B43-D0DEFB807ECD}"/>
+              </a:ext>
+            </a:extLst>
+          </p:cNvPr>
+          <p:cNvSpPr txBox="1"/>
+          <p:nvPr/>
+        </p:nvSpPr>
+        <p:spPr>
+          <a:xfrm>
+            <a:off x="4128176" y="3398284"/>
+            <a:ext cx="6088077" cy="1323439"/>
+          </a:xfrm>
+          <a:prstGeom prst="rect">
+            <a:avLst/>
+          </a:prstGeom>
+          <a:noFill/>
+        </p:spPr>
+        <p:txBody>
+          <a:bodyPr wrap="none" rtlCol="0">
+            <a:spAutoFit/>
+          </a:bodyPr>
+          <a:lstStyle/>
+          <a:p>
+            <a:r>
+              <a:rPr lang="fr-CA" sz="8000" noProof="1">
+                <a:solidFill>
+                  <a:schemeClr val="accent1"/>
+                </a:solidFill>
+                <a:latin typeface="Dubai Light" panose="020B0303030403030204" pitchFamily="34" charset="-78"/>
+                <a:cs typeface="Dubai Light" panose="020B0303030403030204" pitchFamily="34" charset="-78"/>
+              </a:rPr>
+              <a:t>kinetics toolkit</a:t>
+            </a:r>
+          </a:p>
+        </p:txBody>
+      </p:sp>
     </p:spTree>
     <p:extLst>
       <p:ext uri="{BB962C8B-B14F-4D97-AF65-F5344CB8AC3E}">

</xml_diff>

<commit_message>
Migration from ktk.gui to limitedinteraction
</commit_message>
<xml_diff>
--- a/logo.pptx
+++ b/logo.pptx
@@ -259,7 +259,7 @@
           <a:p>
             <a:fld id="{2DA01E9C-F9D9-044C-977D-997D3E353488}" type="datetimeFigureOut">
               <a:rPr lang="en-US" smtClean="0"/>
-              <a:t>8/5/20</a:t>
+              <a:t>12/9/20</a:t>
             </a:fld>
             <a:endParaRPr lang="en-US"/>
           </a:p>
@@ -457,7 +457,7 @@
           <a:p>
             <a:fld id="{2DA01E9C-F9D9-044C-977D-997D3E353488}" type="datetimeFigureOut">
               <a:rPr lang="en-US" smtClean="0"/>
-              <a:t>8/5/20</a:t>
+              <a:t>12/9/20</a:t>
             </a:fld>
             <a:endParaRPr lang="en-US"/>
           </a:p>
@@ -665,7 +665,7 @@
           <a:p>
             <a:fld id="{2DA01E9C-F9D9-044C-977D-997D3E353488}" type="datetimeFigureOut">
               <a:rPr lang="en-US" smtClean="0"/>
-              <a:t>8/5/20</a:t>
+              <a:t>12/9/20</a:t>
             </a:fld>
             <a:endParaRPr lang="en-US"/>
           </a:p>
@@ -863,7 +863,7 @@
           <a:p>
             <a:fld id="{2DA01E9C-F9D9-044C-977D-997D3E353488}" type="datetimeFigureOut">
               <a:rPr lang="en-US" smtClean="0"/>
-              <a:t>8/5/20</a:t>
+              <a:t>12/9/20</a:t>
             </a:fld>
             <a:endParaRPr lang="en-US"/>
           </a:p>
@@ -1138,7 +1138,7 @@
           <a:p>
             <a:fld id="{2DA01E9C-F9D9-044C-977D-997D3E353488}" type="datetimeFigureOut">
               <a:rPr lang="en-US" smtClean="0"/>
-              <a:t>8/5/20</a:t>
+              <a:t>12/9/20</a:t>
             </a:fld>
             <a:endParaRPr lang="en-US"/>
           </a:p>
@@ -1403,7 +1403,7 @@
           <a:p>
             <a:fld id="{2DA01E9C-F9D9-044C-977D-997D3E353488}" type="datetimeFigureOut">
               <a:rPr lang="en-US" smtClean="0"/>
-              <a:t>8/5/20</a:t>
+              <a:t>12/9/20</a:t>
             </a:fld>
             <a:endParaRPr lang="en-US"/>
           </a:p>
@@ -1815,7 +1815,7 @@
           <a:p>
             <a:fld id="{2DA01E9C-F9D9-044C-977D-997D3E353488}" type="datetimeFigureOut">
               <a:rPr lang="en-US" smtClean="0"/>
-              <a:t>8/5/20</a:t>
+              <a:t>12/9/20</a:t>
             </a:fld>
             <a:endParaRPr lang="en-US"/>
           </a:p>
@@ -1956,7 +1956,7 @@
           <a:p>
             <a:fld id="{2DA01E9C-F9D9-044C-977D-997D3E353488}" type="datetimeFigureOut">
               <a:rPr lang="en-US" smtClean="0"/>
-              <a:t>8/5/20</a:t>
+              <a:t>12/9/20</a:t>
             </a:fld>
             <a:endParaRPr lang="en-US"/>
           </a:p>
@@ -2069,7 +2069,7 @@
           <a:p>
             <a:fld id="{2DA01E9C-F9D9-044C-977D-997D3E353488}" type="datetimeFigureOut">
               <a:rPr lang="en-US" smtClean="0"/>
-              <a:t>8/5/20</a:t>
+              <a:t>12/9/20</a:t>
             </a:fld>
             <a:endParaRPr lang="en-US"/>
           </a:p>
@@ -2380,7 +2380,7 @@
           <a:p>
             <a:fld id="{2DA01E9C-F9D9-044C-977D-997D3E353488}" type="datetimeFigureOut">
               <a:rPr lang="en-US" smtClean="0"/>
-              <a:t>8/5/20</a:t>
+              <a:t>12/9/20</a:t>
             </a:fld>
             <a:endParaRPr lang="en-US"/>
           </a:p>
@@ -2668,7 +2668,7 @@
           <a:p>
             <a:fld id="{2DA01E9C-F9D9-044C-977D-997D3E353488}" type="datetimeFigureOut">
               <a:rPr lang="en-US" smtClean="0"/>
-              <a:t>8/5/20</a:t>
+              <a:t>12/9/20</a:t>
             </a:fld>
             <a:endParaRPr lang="en-US"/>
           </a:p>
@@ -2909,7 +2909,7 @@
           <a:p>
             <a:fld id="{2DA01E9C-F9D9-044C-977D-997D3E353488}" type="datetimeFigureOut">
               <a:rPr lang="en-US" smtClean="0"/>
-              <a:t>8/5/20</a:t>
+              <a:t>12/9/20</a:t>
             </a:fld>
             <a:endParaRPr lang="en-US"/>
           </a:p>
@@ -3328,10 +3328,10 @@
       </p:grpSpPr>
       <p:sp>
         <p:nvSpPr>
-          <p:cNvPr id="18" name="Parallelogram 17">
-            <a:extLst>
-              <a:ext uri="{FF2B5EF4-FFF2-40B4-BE49-F238E27FC236}">
-                <a16:creationId xmlns:a16="http://schemas.microsoft.com/office/drawing/2014/main" id="{F583D836-B8DA-094D-98B1-30DF81B29248}"/>
+          <p:cNvPr id="20" name="Rectangle 19">
+            <a:extLst>
+              <a:ext uri="{FF2B5EF4-FFF2-40B4-BE49-F238E27FC236}">
+                <a16:creationId xmlns:a16="http://schemas.microsoft.com/office/drawing/2014/main" id="{FB8057E8-81B8-1F42-9B24-571399DB53E8}"/>
               </a:ext>
             </a:extLst>
           </p:cNvPr>
@@ -3340,20 +3340,25 @@
         </p:nvSpPr>
         <p:spPr>
           <a:xfrm>
-            <a:off x="6833875" y="1924884"/>
-            <a:ext cx="1112110" cy="752058"/>
+            <a:off x="6401391" y="1245439"/>
+            <a:ext cx="432484" cy="2183561"/>
           </a:xfrm>
-          <a:prstGeom prst="parallelogram">
-            <a:avLst>
-              <a:gd name="adj" fmla="val 84016"/>
-            </a:avLst>
+          <a:prstGeom prst="rect">
+            <a:avLst/>
           </a:prstGeom>
           <a:solidFill>
-            <a:srgbClr val="C00000"/>
+            <a:schemeClr val="accent6"/>
           </a:solidFill>
           <a:ln>
             <a:noFill/>
           </a:ln>
+          <a:effectLst>
+            <a:outerShdw blurRad="292100" dist="38100" dir="2700000" algn="tl" rotWithShape="0">
+              <a:prstClr val="black">
+                <a:alpha val="40000"/>
+              </a:prstClr>
+            </a:outerShdw>
+          </a:effectLst>
         </p:spPr>
         <p:style>
           <a:lnRef idx="2">
@@ -3394,8 +3399,8 @@
         </p:nvSpPr>
         <p:spPr>
           <a:xfrm flipV="1">
-            <a:off x="6844385" y="2676942"/>
-            <a:ext cx="1112110" cy="752058"/>
+            <a:off x="6833875" y="2676942"/>
+            <a:ext cx="1122620" cy="752058"/>
           </a:xfrm>
           <a:prstGeom prst="parallelogram">
             <a:avLst>
@@ -3405,6 +3410,13 @@
           <a:ln>
             <a:noFill/>
           </a:ln>
+          <a:effectLst>
+            <a:outerShdw blurRad="292100" dist="38100" dir="2700000" algn="tl" rotWithShape="0">
+              <a:prstClr val="black">
+                <a:alpha val="40000"/>
+              </a:prstClr>
+            </a:outerShdw>
+          </a:effectLst>
         </p:spPr>
         <p:style>
           <a:lnRef idx="2">
@@ -3433,10 +3445,10 @@
       </p:sp>
       <p:sp>
         <p:nvSpPr>
-          <p:cNvPr id="20" name="Rectangle 19">
-            <a:extLst>
-              <a:ext uri="{FF2B5EF4-FFF2-40B4-BE49-F238E27FC236}">
-                <a16:creationId xmlns:a16="http://schemas.microsoft.com/office/drawing/2014/main" id="{FB8057E8-81B8-1F42-9B24-571399DB53E8}"/>
+          <p:cNvPr id="18" name="Parallelogram 17">
+            <a:extLst>
+              <a:ext uri="{FF2B5EF4-FFF2-40B4-BE49-F238E27FC236}">
+                <a16:creationId xmlns:a16="http://schemas.microsoft.com/office/drawing/2014/main" id="{F583D836-B8DA-094D-98B1-30DF81B29248}"/>
               </a:ext>
             </a:extLst>
           </p:cNvPr>
@@ -3445,18 +3457,27 @@
         </p:nvSpPr>
         <p:spPr>
           <a:xfrm>
-            <a:off x="6401391" y="1245439"/>
-            <a:ext cx="432484" cy="2183561"/>
+            <a:off x="6833875" y="1924884"/>
+            <a:ext cx="1112110" cy="752058"/>
           </a:xfrm>
-          <a:prstGeom prst="rect">
-            <a:avLst/>
+          <a:prstGeom prst="parallelogram">
+            <a:avLst>
+              <a:gd name="adj" fmla="val 84016"/>
+            </a:avLst>
           </a:prstGeom>
           <a:solidFill>
-            <a:schemeClr val="accent6"/>
+            <a:srgbClr val="C00000"/>
           </a:solidFill>
           <a:ln>
             <a:noFill/>
           </a:ln>
+          <a:effectLst>
+            <a:outerShdw blurRad="292100" dist="38100" dir="2700000" algn="tl" rotWithShape="0">
+              <a:prstClr val="black">
+                <a:alpha val="40000"/>
+              </a:prstClr>
+            </a:outerShdw>
+          </a:effectLst>
         </p:spPr>
         <p:style>
           <a:lnRef idx="2">

</xml_diff>

<commit_message>
Started a big update on documentation.
</commit_message>
<xml_diff>
--- a/logo.pptx
+++ b/logo.pptx
@@ -6,6 +6,7 @@
   </p:sldMasterIdLst>
   <p:sldIdLst>
     <p:sldId id="256" r:id="rId2"/>
+    <p:sldId id="257" r:id="rId3"/>
   </p:sldIdLst>
   <p:sldSz cx="12192000" cy="6858000"/>
   <p:notesSz cx="6858000" cy="9144000"/>
@@ -259,7 +260,7 @@
           <a:p>
             <a:fld id="{2DA01E9C-F9D9-044C-977D-997D3E353488}" type="datetimeFigureOut">
               <a:rPr lang="en-US" smtClean="0"/>
-              <a:t>12/9/20</a:t>
+              <a:t>3/1/21</a:t>
             </a:fld>
             <a:endParaRPr lang="en-US"/>
           </a:p>
@@ -457,7 +458,7 @@
           <a:p>
             <a:fld id="{2DA01E9C-F9D9-044C-977D-997D3E353488}" type="datetimeFigureOut">
               <a:rPr lang="en-US" smtClean="0"/>
-              <a:t>12/9/20</a:t>
+              <a:t>3/1/21</a:t>
             </a:fld>
             <a:endParaRPr lang="en-US"/>
           </a:p>
@@ -665,7 +666,7 @@
           <a:p>
             <a:fld id="{2DA01E9C-F9D9-044C-977D-997D3E353488}" type="datetimeFigureOut">
               <a:rPr lang="en-US" smtClean="0"/>
-              <a:t>12/9/20</a:t>
+              <a:t>3/1/21</a:t>
             </a:fld>
             <a:endParaRPr lang="en-US"/>
           </a:p>
@@ -863,7 +864,7 @@
           <a:p>
             <a:fld id="{2DA01E9C-F9D9-044C-977D-997D3E353488}" type="datetimeFigureOut">
               <a:rPr lang="en-US" smtClean="0"/>
-              <a:t>12/9/20</a:t>
+              <a:t>3/1/21</a:t>
             </a:fld>
             <a:endParaRPr lang="en-US"/>
           </a:p>
@@ -1138,7 +1139,7 @@
           <a:p>
             <a:fld id="{2DA01E9C-F9D9-044C-977D-997D3E353488}" type="datetimeFigureOut">
               <a:rPr lang="en-US" smtClean="0"/>
-              <a:t>12/9/20</a:t>
+              <a:t>3/1/21</a:t>
             </a:fld>
             <a:endParaRPr lang="en-US"/>
           </a:p>
@@ -1403,7 +1404,7 @@
           <a:p>
             <a:fld id="{2DA01E9C-F9D9-044C-977D-997D3E353488}" type="datetimeFigureOut">
               <a:rPr lang="en-US" smtClean="0"/>
-              <a:t>12/9/20</a:t>
+              <a:t>3/1/21</a:t>
             </a:fld>
             <a:endParaRPr lang="en-US"/>
           </a:p>
@@ -1815,7 +1816,7 @@
           <a:p>
             <a:fld id="{2DA01E9C-F9D9-044C-977D-997D3E353488}" type="datetimeFigureOut">
               <a:rPr lang="en-US" smtClean="0"/>
-              <a:t>12/9/20</a:t>
+              <a:t>3/1/21</a:t>
             </a:fld>
             <a:endParaRPr lang="en-US"/>
           </a:p>
@@ -1956,7 +1957,7 @@
           <a:p>
             <a:fld id="{2DA01E9C-F9D9-044C-977D-997D3E353488}" type="datetimeFigureOut">
               <a:rPr lang="en-US" smtClean="0"/>
-              <a:t>12/9/20</a:t>
+              <a:t>3/1/21</a:t>
             </a:fld>
             <a:endParaRPr lang="en-US"/>
           </a:p>
@@ -2069,7 +2070,7 @@
           <a:p>
             <a:fld id="{2DA01E9C-F9D9-044C-977D-997D3E353488}" type="datetimeFigureOut">
               <a:rPr lang="en-US" smtClean="0"/>
-              <a:t>12/9/20</a:t>
+              <a:t>3/1/21</a:t>
             </a:fld>
             <a:endParaRPr lang="en-US"/>
           </a:p>
@@ -2380,7 +2381,7 @@
           <a:p>
             <a:fld id="{2DA01E9C-F9D9-044C-977D-997D3E353488}" type="datetimeFigureOut">
               <a:rPr lang="en-US" smtClean="0"/>
-              <a:t>12/9/20</a:t>
+              <a:t>3/1/21</a:t>
             </a:fld>
             <a:endParaRPr lang="en-US"/>
           </a:p>
@@ -2668,7 +2669,7 @@
           <a:p>
             <a:fld id="{2DA01E9C-F9D9-044C-977D-997D3E353488}" type="datetimeFigureOut">
               <a:rPr lang="en-US" smtClean="0"/>
-              <a:t>12/9/20</a:t>
+              <a:t>3/1/21</a:t>
             </a:fld>
             <a:endParaRPr lang="en-US"/>
           </a:p>
@@ -2909,7 +2910,7 @@
           <a:p>
             <a:fld id="{2DA01E9C-F9D9-044C-977D-997D3E353488}" type="datetimeFigureOut">
               <a:rPr lang="en-US" smtClean="0"/>
-              <a:t>12/9/20</a:t>
+              <a:t>3/1/21</a:t>
             </a:fld>
             <a:endParaRPr lang="en-US"/>
           </a:p>
@@ -3603,6 +3604,328 @@
 </p:sld>
 </file>
 
+<file path=ppt/slides/slide2.xml><?xml version="1.0" encoding="utf-8"?>
+<p:sld xmlns:a="http://schemas.openxmlformats.org/drawingml/2006/main" xmlns:r="http://schemas.openxmlformats.org/officeDocument/2006/relationships" xmlns:p="http://schemas.openxmlformats.org/presentationml/2006/main">
+  <p:cSld>
+    <p:spTree>
+      <p:nvGrpSpPr>
+        <p:cNvPr id="1" name=""/>
+        <p:cNvGrpSpPr/>
+        <p:nvPr/>
+      </p:nvGrpSpPr>
+      <p:grpSpPr>
+        <a:xfrm>
+          <a:off x="0" y="0"/>
+          <a:ext cx="0" cy="0"/>
+          <a:chOff x="0" y="0"/>
+          <a:chExt cx="0" cy="0"/>
+        </a:xfrm>
+      </p:grpSpPr>
+      <p:sp>
+        <p:nvSpPr>
+          <p:cNvPr id="4" name="Rectangle 3">
+            <a:extLst>
+              <a:ext uri="{FF2B5EF4-FFF2-40B4-BE49-F238E27FC236}">
+                <a16:creationId xmlns:a16="http://schemas.microsoft.com/office/drawing/2014/main" id="{95447BEE-15A9-7847-94AF-22772F57986E}"/>
+              </a:ext>
+            </a:extLst>
+          </p:cNvPr>
+          <p:cNvSpPr/>
+          <p:nvPr/>
+        </p:nvSpPr>
+        <p:spPr>
+          <a:xfrm>
+            <a:off x="3000777" y="270456"/>
+            <a:ext cx="8718998" cy="4971245"/>
+          </a:xfrm>
+          <a:prstGeom prst="rect">
+            <a:avLst/>
+          </a:prstGeom>
+        </p:spPr>
+        <p:style>
+          <a:lnRef idx="2">
+            <a:schemeClr val="dk1">
+              <a:shade val="50000"/>
+            </a:schemeClr>
+          </a:lnRef>
+          <a:fillRef idx="1">
+            <a:schemeClr val="dk1"/>
+          </a:fillRef>
+          <a:effectRef idx="0">
+            <a:schemeClr val="dk1"/>
+          </a:effectRef>
+          <a:fontRef idx="minor">
+            <a:schemeClr val="lt1"/>
+          </a:fontRef>
+        </p:style>
+        <p:txBody>
+          <a:bodyPr rtlCol="0" anchor="ctr"/>
+          <a:lstStyle/>
+          <a:p>
+            <a:pPr algn="ctr"/>
+            <a:endParaRPr lang="fr-CA"/>
+          </a:p>
+        </p:txBody>
+      </p:sp>
+      <p:sp>
+        <p:nvSpPr>
+          <p:cNvPr id="20" name="Rectangle 19">
+            <a:extLst>
+              <a:ext uri="{FF2B5EF4-FFF2-40B4-BE49-F238E27FC236}">
+                <a16:creationId xmlns:a16="http://schemas.microsoft.com/office/drawing/2014/main" id="{FB8057E8-81B8-1F42-9B24-571399DB53E8}"/>
+              </a:ext>
+            </a:extLst>
+          </p:cNvPr>
+          <p:cNvSpPr/>
+          <p:nvPr/>
+        </p:nvSpPr>
+        <p:spPr>
+          <a:xfrm>
+            <a:off x="6401391" y="1245439"/>
+            <a:ext cx="432484" cy="2183561"/>
+          </a:xfrm>
+          <a:prstGeom prst="rect">
+            <a:avLst/>
+          </a:prstGeom>
+          <a:solidFill>
+            <a:srgbClr val="70AD47"/>
+          </a:solidFill>
+          <a:ln>
+            <a:noFill/>
+          </a:ln>
+          <a:effectLst/>
+        </p:spPr>
+        <p:style>
+          <a:lnRef idx="2">
+            <a:schemeClr val="accent1">
+              <a:shade val="50000"/>
+            </a:schemeClr>
+          </a:lnRef>
+          <a:fillRef idx="1">
+            <a:schemeClr val="accent1"/>
+          </a:fillRef>
+          <a:effectRef idx="0">
+            <a:schemeClr val="accent1"/>
+          </a:effectRef>
+          <a:fontRef idx="minor">
+            <a:schemeClr val="lt1"/>
+          </a:fontRef>
+        </p:style>
+        <p:txBody>
+          <a:bodyPr rtlCol="0" anchor="ctr"/>
+          <a:lstStyle/>
+          <a:p>
+            <a:pPr algn="ctr"/>
+            <a:endParaRPr lang="en-US"/>
+          </a:p>
+        </p:txBody>
+      </p:sp>
+      <p:sp>
+        <p:nvSpPr>
+          <p:cNvPr id="19" name="Parallelogram 18">
+            <a:extLst>
+              <a:ext uri="{FF2B5EF4-FFF2-40B4-BE49-F238E27FC236}">
+                <a16:creationId xmlns:a16="http://schemas.microsoft.com/office/drawing/2014/main" id="{F66D7793-8322-8842-B4F2-D33820E70762}"/>
+              </a:ext>
+            </a:extLst>
+          </p:cNvPr>
+          <p:cNvSpPr/>
+          <p:nvPr/>
+        </p:nvSpPr>
+        <p:spPr>
+          <a:xfrm flipV="1">
+            <a:off x="6833875" y="2676942"/>
+            <a:ext cx="1122620" cy="752058"/>
+          </a:xfrm>
+          <a:prstGeom prst="parallelogram">
+            <a:avLst>
+              <a:gd name="adj" fmla="val 85659"/>
+            </a:avLst>
+          </a:prstGeom>
+          <a:ln>
+            <a:noFill/>
+          </a:ln>
+          <a:effectLst/>
+        </p:spPr>
+        <p:style>
+          <a:lnRef idx="2">
+            <a:schemeClr val="accent1">
+              <a:shade val="50000"/>
+            </a:schemeClr>
+          </a:lnRef>
+          <a:fillRef idx="1">
+            <a:schemeClr val="accent1"/>
+          </a:fillRef>
+          <a:effectRef idx="0">
+            <a:schemeClr val="accent1"/>
+          </a:effectRef>
+          <a:fontRef idx="minor">
+            <a:schemeClr val="lt1"/>
+          </a:fontRef>
+        </p:style>
+        <p:txBody>
+          <a:bodyPr rtlCol="0" anchor="ctr"/>
+          <a:lstStyle/>
+          <a:p>
+            <a:pPr algn="ctr"/>
+            <a:endParaRPr lang="en-US"/>
+          </a:p>
+        </p:txBody>
+      </p:sp>
+      <p:sp>
+        <p:nvSpPr>
+          <p:cNvPr id="18" name="Parallelogram 17">
+            <a:extLst>
+              <a:ext uri="{FF2B5EF4-FFF2-40B4-BE49-F238E27FC236}">
+                <a16:creationId xmlns:a16="http://schemas.microsoft.com/office/drawing/2014/main" id="{F583D836-B8DA-094D-98B1-30DF81B29248}"/>
+              </a:ext>
+            </a:extLst>
+          </p:cNvPr>
+          <p:cNvSpPr/>
+          <p:nvPr/>
+        </p:nvSpPr>
+        <p:spPr>
+          <a:xfrm>
+            <a:off x="6833875" y="1924884"/>
+            <a:ext cx="1112110" cy="752058"/>
+          </a:xfrm>
+          <a:prstGeom prst="parallelogram">
+            <a:avLst>
+              <a:gd name="adj" fmla="val 84016"/>
+            </a:avLst>
+          </a:prstGeom>
+          <a:solidFill>
+            <a:srgbClr val="C00000"/>
+          </a:solidFill>
+          <a:ln>
+            <a:noFill/>
+          </a:ln>
+          <a:effectLst/>
+        </p:spPr>
+        <p:style>
+          <a:lnRef idx="2">
+            <a:schemeClr val="accent1">
+              <a:shade val="50000"/>
+            </a:schemeClr>
+          </a:lnRef>
+          <a:fillRef idx="1">
+            <a:schemeClr val="accent1"/>
+          </a:fillRef>
+          <a:effectRef idx="0">
+            <a:schemeClr val="accent1"/>
+          </a:effectRef>
+          <a:fontRef idx="minor">
+            <a:schemeClr val="lt1"/>
+          </a:fontRef>
+        </p:style>
+        <p:txBody>
+          <a:bodyPr rtlCol="0" anchor="ctr"/>
+          <a:lstStyle/>
+          <a:p>
+            <a:pPr algn="ctr"/>
+            <a:endParaRPr lang="en-US"/>
+          </a:p>
+        </p:txBody>
+      </p:sp>
+      <p:pic>
+        <p:nvPicPr>
+          <p:cNvPr id="3" name="Picture 2" descr="A close up of a sign&#10;&#10;Description automatically generated">
+            <a:extLst>
+              <a:ext uri="{FF2B5EF4-FFF2-40B4-BE49-F238E27FC236}">
+                <a16:creationId xmlns:a16="http://schemas.microsoft.com/office/drawing/2014/main" id="{F7D25E32-CD21-D140-829B-0ED1E14C5C47}"/>
+              </a:ext>
+            </a:extLst>
+          </p:cNvPr>
+          <p:cNvPicPr>
+            <a:picLocks noChangeAspect="1"/>
+          </p:cNvPicPr>
+          <p:nvPr/>
+        </p:nvPicPr>
+        <p:blipFill>
+          <a:blip r:embed="rId2">
+            <a:extLst>
+              <a:ext uri="{BEBA8EAE-BF5A-486C-A8C5-ECC9F3942E4B}">
+                <a14:imgProps xmlns:a14="http://schemas.microsoft.com/office/drawing/2010/main">
+                  <a14:imgLayer r:embed="rId3">
+                    <a14:imgEffect>
+                      <a14:backgroundRemoval t="10000" b="90000" l="10000" r="90000">
+                        <a14:foregroundMark x1="63542" y1="40066" x2="52431" y2="56623"/>
+                        <a14:foregroundMark x1="52778" y1="62914" x2="63889" y2="77815"/>
+                      </a14:backgroundRemoval>
+                    </a14:imgEffect>
+                  </a14:imgLayer>
+                </a14:imgProps>
+              </a:ext>
+            </a:extLst>
+          </a:blip>
+          <a:stretch>
+            <a:fillRect/>
+          </a:stretch>
+        </p:blipFill>
+        <p:spPr>
+          <a:xfrm>
+            <a:off x="-986638" y="1799981"/>
+            <a:ext cx="3657600" cy="3835400"/>
+          </a:xfrm>
+          <a:prstGeom prst="rect">
+            <a:avLst/>
+          </a:prstGeom>
+        </p:spPr>
+      </p:pic>
+      <p:sp>
+        <p:nvSpPr>
+          <p:cNvPr id="2" name="TextBox 1">
+            <a:extLst>
+              <a:ext uri="{FF2B5EF4-FFF2-40B4-BE49-F238E27FC236}">
+                <a16:creationId xmlns:a16="http://schemas.microsoft.com/office/drawing/2014/main" id="{DA28ED80-1720-D247-8B43-D0DEFB807ECD}"/>
+              </a:ext>
+            </a:extLst>
+          </p:cNvPr>
+          <p:cNvSpPr txBox="1"/>
+          <p:nvPr/>
+        </p:nvSpPr>
+        <p:spPr>
+          <a:xfrm>
+            <a:off x="4128176" y="3398284"/>
+            <a:ext cx="6088077" cy="1323439"/>
+          </a:xfrm>
+          <a:prstGeom prst="rect">
+            <a:avLst/>
+          </a:prstGeom>
+          <a:noFill/>
+        </p:spPr>
+        <p:txBody>
+          <a:bodyPr wrap="none" rtlCol="0">
+            <a:spAutoFit/>
+          </a:bodyPr>
+          <a:lstStyle/>
+          <a:p>
+            <a:r>
+              <a:rPr lang="fr-CA" sz="8000" noProof="1">
+                <a:solidFill>
+                  <a:schemeClr val="accent1"/>
+                </a:solidFill>
+                <a:latin typeface="Dubai Light" panose="020B0303030403030204" pitchFamily="34" charset="-78"/>
+                <a:cs typeface="Dubai Light" panose="020B0303030403030204" pitchFamily="34" charset="-78"/>
+              </a:rPr>
+              <a:t>kinetics toolkit</a:t>
+            </a:r>
+          </a:p>
+        </p:txBody>
+      </p:sp>
+    </p:spTree>
+    <p:extLst>
+      <p:ext uri="{BB962C8B-B14F-4D97-AF65-F5344CB8AC3E}">
+        <p14:creationId xmlns:p14="http://schemas.microsoft.com/office/powerpoint/2010/main" val="2086189609"/>
+      </p:ext>
+    </p:extLst>
+  </p:cSld>
+  <p:clrMapOvr>
+    <a:masterClrMapping/>
+  </p:clrMapOvr>
+</p:sld>
+</file>
+
 <file path=ppt/theme/theme1.xml><?xml version="1.0" encoding="utf-8"?>
 <a:theme xmlns:a="http://schemas.openxmlformats.org/drawingml/2006/main" name="Office Theme">
   <a:themeElements>

</xml_diff>

<commit_message>
[STABLE] Big overhaul in website.
</commit_message>
<xml_diff>
--- a/logo.pptx
+++ b/logo.pptx
@@ -7,6 +7,7 @@
   <p:sldIdLst>
     <p:sldId id="256" r:id="rId2"/>
     <p:sldId id="257" r:id="rId3"/>
+    <p:sldId id="258" r:id="rId4"/>
   </p:sldIdLst>
   <p:sldSz cx="12192000" cy="6858000"/>
   <p:notesSz cx="6858000" cy="9144000"/>
@@ -260,7 +261,7 @@
           <a:p>
             <a:fld id="{2DA01E9C-F9D9-044C-977D-997D3E353488}" type="datetimeFigureOut">
               <a:rPr lang="en-US" smtClean="0"/>
-              <a:t>3/1/21</a:t>
+              <a:t>3/3/21</a:t>
             </a:fld>
             <a:endParaRPr lang="en-US"/>
           </a:p>
@@ -458,7 +459,7 @@
           <a:p>
             <a:fld id="{2DA01E9C-F9D9-044C-977D-997D3E353488}" type="datetimeFigureOut">
               <a:rPr lang="en-US" smtClean="0"/>
-              <a:t>3/1/21</a:t>
+              <a:t>3/3/21</a:t>
             </a:fld>
             <a:endParaRPr lang="en-US"/>
           </a:p>
@@ -666,7 +667,7 @@
           <a:p>
             <a:fld id="{2DA01E9C-F9D9-044C-977D-997D3E353488}" type="datetimeFigureOut">
               <a:rPr lang="en-US" smtClean="0"/>
-              <a:t>3/1/21</a:t>
+              <a:t>3/3/21</a:t>
             </a:fld>
             <a:endParaRPr lang="en-US"/>
           </a:p>
@@ -864,7 +865,7 @@
           <a:p>
             <a:fld id="{2DA01E9C-F9D9-044C-977D-997D3E353488}" type="datetimeFigureOut">
               <a:rPr lang="en-US" smtClean="0"/>
-              <a:t>3/1/21</a:t>
+              <a:t>3/3/21</a:t>
             </a:fld>
             <a:endParaRPr lang="en-US"/>
           </a:p>
@@ -1139,7 +1140,7 @@
           <a:p>
             <a:fld id="{2DA01E9C-F9D9-044C-977D-997D3E353488}" type="datetimeFigureOut">
               <a:rPr lang="en-US" smtClean="0"/>
-              <a:t>3/1/21</a:t>
+              <a:t>3/3/21</a:t>
             </a:fld>
             <a:endParaRPr lang="en-US"/>
           </a:p>
@@ -1404,7 +1405,7 @@
           <a:p>
             <a:fld id="{2DA01E9C-F9D9-044C-977D-997D3E353488}" type="datetimeFigureOut">
               <a:rPr lang="en-US" smtClean="0"/>
-              <a:t>3/1/21</a:t>
+              <a:t>3/3/21</a:t>
             </a:fld>
             <a:endParaRPr lang="en-US"/>
           </a:p>
@@ -1816,7 +1817,7 @@
           <a:p>
             <a:fld id="{2DA01E9C-F9D9-044C-977D-997D3E353488}" type="datetimeFigureOut">
               <a:rPr lang="en-US" smtClean="0"/>
-              <a:t>3/1/21</a:t>
+              <a:t>3/3/21</a:t>
             </a:fld>
             <a:endParaRPr lang="en-US"/>
           </a:p>
@@ -1957,7 +1958,7 @@
           <a:p>
             <a:fld id="{2DA01E9C-F9D9-044C-977D-997D3E353488}" type="datetimeFigureOut">
               <a:rPr lang="en-US" smtClean="0"/>
-              <a:t>3/1/21</a:t>
+              <a:t>3/3/21</a:t>
             </a:fld>
             <a:endParaRPr lang="en-US"/>
           </a:p>
@@ -2070,7 +2071,7 @@
           <a:p>
             <a:fld id="{2DA01E9C-F9D9-044C-977D-997D3E353488}" type="datetimeFigureOut">
               <a:rPr lang="en-US" smtClean="0"/>
-              <a:t>3/1/21</a:t>
+              <a:t>3/3/21</a:t>
             </a:fld>
             <a:endParaRPr lang="en-US"/>
           </a:p>
@@ -2381,7 +2382,7 @@
           <a:p>
             <a:fld id="{2DA01E9C-F9D9-044C-977D-997D3E353488}" type="datetimeFigureOut">
               <a:rPr lang="en-US" smtClean="0"/>
-              <a:t>3/1/21</a:t>
+              <a:t>3/3/21</a:t>
             </a:fld>
             <a:endParaRPr lang="en-US"/>
           </a:p>
@@ -2669,7 +2670,7 @@
           <a:p>
             <a:fld id="{2DA01E9C-F9D9-044C-977D-997D3E353488}" type="datetimeFigureOut">
               <a:rPr lang="en-US" smtClean="0"/>
-              <a:t>3/1/21</a:t>
+              <a:t>3/3/21</a:t>
             </a:fld>
             <a:endParaRPr lang="en-US"/>
           </a:p>
@@ -2910,7 +2911,7 @@
           <a:p>
             <a:fld id="{2DA01E9C-F9D9-044C-977D-997D3E353488}" type="datetimeFigureOut">
               <a:rPr lang="en-US" smtClean="0"/>
-              <a:t>3/1/21</a:t>
+              <a:t>3/3/21</a:t>
             </a:fld>
             <a:endParaRPr lang="en-US"/>
           </a:p>
@@ -3827,51 +3828,6 @@
           </a:p>
         </p:txBody>
       </p:sp>
-      <p:pic>
-        <p:nvPicPr>
-          <p:cNvPr id="3" name="Picture 2" descr="A close up of a sign&#10;&#10;Description automatically generated">
-            <a:extLst>
-              <a:ext uri="{FF2B5EF4-FFF2-40B4-BE49-F238E27FC236}">
-                <a16:creationId xmlns:a16="http://schemas.microsoft.com/office/drawing/2014/main" id="{F7D25E32-CD21-D140-829B-0ED1E14C5C47}"/>
-              </a:ext>
-            </a:extLst>
-          </p:cNvPr>
-          <p:cNvPicPr>
-            <a:picLocks noChangeAspect="1"/>
-          </p:cNvPicPr>
-          <p:nvPr/>
-        </p:nvPicPr>
-        <p:blipFill>
-          <a:blip r:embed="rId2">
-            <a:extLst>
-              <a:ext uri="{BEBA8EAE-BF5A-486C-A8C5-ECC9F3942E4B}">
-                <a14:imgProps xmlns:a14="http://schemas.microsoft.com/office/drawing/2010/main">
-                  <a14:imgLayer r:embed="rId3">
-                    <a14:imgEffect>
-                      <a14:backgroundRemoval t="10000" b="90000" l="10000" r="90000">
-                        <a14:foregroundMark x1="63542" y1="40066" x2="52431" y2="56623"/>
-                        <a14:foregroundMark x1="52778" y1="62914" x2="63889" y2="77815"/>
-                      </a14:backgroundRemoval>
-                    </a14:imgEffect>
-                  </a14:imgLayer>
-                </a14:imgProps>
-              </a:ext>
-            </a:extLst>
-          </a:blip>
-          <a:stretch>
-            <a:fillRect/>
-          </a:stretch>
-        </p:blipFill>
-        <p:spPr>
-          <a:xfrm>
-            <a:off x="-986638" y="1799981"/>
-            <a:ext cx="3657600" cy="3835400"/>
-          </a:xfrm>
-          <a:prstGeom prst="rect">
-            <a:avLst/>
-          </a:prstGeom>
-        </p:spPr>
-      </p:pic>
       <p:sp>
         <p:nvSpPr>
           <p:cNvPr id="2" name="TextBox 1">
@@ -3917,6 +3873,324 @@
     <p:extLst>
       <p:ext uri="{BB962C8B-B14F-4D97-AF65-F5344CB8AC3E}">
         <p14:creationId xmlns:p14="http://schemas.microsoft.com/office/powerpoint/2010/main" val="2086189609"/>
+      </p:ext>
+    </p:extLst>
+  </p:cSld>
+  <p:clrMapOvr>
+    <a:masterClrMapping/>
+  </p:clrMapOvr>
+</p:sld>
+</file>
+
+<file path=ppt/slides/slide3.xml><?xml version="1.0" encoding="utf-8"?>
+<p:sld xmlns:a="http://schemas.openxmlformats.org/drawingml/2006/main" xmlns:r="http://schemas.openxmlformats.org/officeDocument/2006/relationships" xmlns:p="http://schemas.openxmlformats.org/presentationml/2006/main">
+  <p:cSld>
+    <p:spTree>
+      <p:nvGrpSpPr>
+        <p:cNvPr id="1" name=""/>
+        <p:cNvGrpSpPr/>
+        <p:nvPr/>
+      </p:nvGrpSpPr>
+      <p:grpSpPr>
+        <a:xfrm>
+          <a:off x="0" y="0"/>
+          <a:ext cx="0" cy="0"/>
+          <a:chOff x="0" y="0"/>
+          <a:chExt cx="0" cy="0"/>
+        </a:xfrm>
+      </p:grpSpPr>
+      <p:sp>
+        <p:nvSpPr>
+          <p:cNvPr id="4" name="Rectangle 3">
+            <a:extLst>
+              <a:ext uri="{FF2B5EF4-FFF2-40B4-BE49-F238E27FC236}">
+                <a16:creationId xmlns:a16="http://schemas.microsoft.com/office/drawing/2014/main" id="{95447BEE-15A9-7847-94AF-22772F57986E}"/>
+              </a:ext>
+            </a:extLst>
+          </p:cNvPr>
+          <p:cNvSpPr/>
+          <p:nvPr/>
+        </p:nvSpPr>
+        <p:spPr>
+          <a:xfrm>
+            <a:off x="3000777" y="270456"/>
+            <a:ext cx="8718998" cy="6489267"/>
+          </a:xfrm>
+          <a:prstGeom prst="rect">
+            <a:avLst/>
+          </a:prstGeom>
+        </p:spPr>
+        <p:style>
+          <a:lnRef idx="2">
+            <a:schemeClr val="dk1">
+              <a:shade val="50000"/>
+            </a:schemeClr>
+          </a:lnRef>
+          <a:fillRef idx="1">
+            <a:schemeClr val="dk1"/>
+          </a:fillRef>
+          <a:effectRef idx="0">
+            <a:schemeClr val="dk1"/>
+          </a:effectRef>
+          <a:fontRef idx="minor">
+            <a:schemeClr val="lt1"/>
+          </a:fontRef>
+        </p:style>
+        <p:txBody>
+          <a:bodyPr rtlCol="0" anchor="ctr"/>
+          <a:lstStyle/>
+          <a:p>
+            <a:pPr algn="ctr"/>
+            <a:endParaRPr lang="fr-CA" noProof="1"/>
+          </a:p>
+        </p:txBody>
+      </p:sp>
+      <p:sp>
+        <p:nvSpPr>
+          <p:cNvPr id="20" name="Rectangle 19">
+            <a:extLst>
+              <a:ext uri="{FF2B5EF4-FFF2-40B4-BE49-F238E27FC236}">
+                <a16:creationId xmlns:a16="http://schemas.microsoft.com/office/drawing/2014/main" id="{FB8057E8-81B8-1F42-9B24-571399DB53E8}"/>
+              </a:ext>
+            </a:extLst>
+          </p:cNvPr>
+          <p:cNvSpPr/>
+          <p:nvPr/>
+        </p:nvSpPr>
+        <p:spPr>
+          <a:xfrm>
+            <a:off x="6401391" y="1245439"/>
+            <a:ext cx="432484" cy="2183561"/>
+          </a:xfrm>
+          <a:prstGeom prst="rect">
+            <a:avLst/>
+          </a:prstGeom>
+          <a:solidFill>
+            <a:srgbClr val="70AD47"/>
+          </a:solidFill>
+          <a:ln>
+            <a:noFill/>
+          </a:ln>
+          <a:effectLst/>
+        </p:spPr>
+        <p:style>
+          <a:lnRef idx="2">
+            <a:schemeClr val="accent1">
+              <a:shade val="50000"/>
+            </a:schemeClr>
+          </a:lnRef>
+          <a:fillRef idx="1">
+            <a:schemeClr val="accent1"/>
+          </a:fillRef>
+          <a:effectRef idx="0">
+            <a:schemeClr val="accent1"/>
+          </a:effectRef>
+          <a:fontRef idx="minor">
+            <a:schemeClr val="lt1"/>
+          </a:fontRef>
+        </p:style>
+        <p:txBody>
+          <a:bodyPr rtlCol="0" anchor="ctr"/>
+          <a:lstStyle/>
+          <a:p>
+            <a:pPr algn="ctr"/>
+            <a:endParaRPr lang="en-US" noProof="1"/>
+          </a:p>
+        </p:txBody>
+      </p:sp>
+      <p:sp>
+        <p:nvSpPr>
+          <p:cNvPr id="19" name="Parallelogram 18">
+            <a:extLst>
+              <a:ext uri="{FF2B5EF4-FFF2-40B4-BE49-F238E27FC236}">
+                <a16:creationId xmlns:a16="http://schemas.microsoft.com/office/drawing/2014/main" id="{F66D7793-8322-8842-B4F2-D33820E70762}"/>
+              </a:ext>
+            </a:extLst>
+          </p:cNvPr>
+          <p:cNvSpPr/>
+          <p:nvPr/>
+        </p:nvSpPr>
+        <p:spPr>
+          <a:xfrm flipV="1">
+            <a:off x="6833875" y="2676942"/>
+            <a:ext cx="1122620" cy="752058"/>
+          </a:xfrm>
+          <a:prstGeom prst="parallelogram">
+            <a:avLst>
+              <a:gd name="adj" fmla="val 85659"/>
+            </a:avLst>
+          </a:prstGeom>
+          <a:ln>
+            <a:noFill/>
+          </a:ln>
+          <a:effectLst/>
+        </p:spPr>
+        <p:style>
+          <a:lnRef idx="2">
+            <a:schemeClr val="accent1">
+              <a:shade val="50000"/>
+            </a:schemeClr>
+          </a:lnRef>
+          <a:fillRef idx="1">
+            <a:schemeClr val="accent1"/>
+          </a:fillRef>
+          <a:effectRef idx="0">
+            <a:schemeClr val="accent1"/>
+          </a:effectRef>
+          <a:fontRef idx="minor">
+            <a:schemeClr val="lt1"/>
+          </a:fontRef>
+        </p:style>
+        <p:txBody>
+          <a:bodyPr rtlCol="0" anchor="ctr"/>
+          <a:lstStyle/>
+          <a:p>
+            <a:pPr algn="ctr"/>
+            <a:endParaRPr lang="en-US" noProof="1"/>
+          </a:p>
+        </p:txBody>
+      </p:sp>
+      <p:sp>
+        <p:nvSpPr>
+          <p:cNvPr id="18" name="Parallelogram 17">
+            <a:extLst>
+              <a:ext uri="{FF2B5EF4-FFF2-40B4-BE49-F238E27FC236}">
+                <a16:creationId xmlns:a16="http://schemas.microsoft.com/office/drawing/2014/main" id="{F583D836-B8DA-094D-98B1-30DF81B29248}"/>
+              </a:ext>
+            </a:extLst>
+          </p:cNvPr>
+          <p:cNvSpPr/>
+          <p:nvPr/>
+        </p:nvSpPr>
+        <p:spPr>
+          <a:xfrm>
+            <a:off x="6833875" y="1924884"/>
+            <a:ext cx="1112110" cy="752058"/>
+          </a:xfrm>
+          <a:prstGeom prst="parallelogram">
+            <a:avLst>
+              <a:gd name="adj" fmla="val 84016"/>
+            </a:avLst>
+          </a:prstGeom>
+          <a:solidFill>
+            <a:srgbClr val="C00000"/>
+          </a:solidFill>
+          <a:ln>
+            <a:noFill/>
+          </a:ln>
+          <a:effectLst/>
+        </p:spPr>
+        <p:style>
+          <a:lnRef idx="2">
+            <a:schemeClr val="accent1">
+              <a:shade val="50000"/>
+            </a:schemeClr>
+          </a:lnRef>
+          <a:fillRef idx="1">
+            <a:schemeClr val="accent1"/>
+          </a:fillRef>
+          <a:effectRef idx="0">
+            <a:schemeClr val="accent1"/>
+          </a:effectRef>
+          <a:fontRef idx="minor">
+            <a:schemeClr val="lt1"/>
+          </a:fontRef>
+        </p:style>
+        <p:txBody>
+          <a:bodyPr rtlCol="0" anchor="ctr"/>
+          <a:lstStyle/>
+          <a:p>
+            <a:pPr algn="ctr"/>
+            <a:endParaRPr lang="en-US" noProof="1"/>
+          </a:p>
+        </p:txBody>
+      </p:sp>
+      <p:sp>
+        <p:nvSpPr>
+          <p:cNvPr id="2" name="TextBox 1">
+            <a:extLst>
+              <a:ext uri="{FF2B5EF4-FFF2-40B4-BE49-F238E27FC236}">
+                <a16:creationId xmlns:a16="http://schemas.microsoft.com/office/drawing/2014/main" id="{DA28ED80-1720-D247-8B43-D0DEFB807ECD}"/>
+              </a:ext>
+            </a:extLst>
+          </p:cNvPr>
+          <p:cNvSpPr txBox="1"/>
+          <p:nvPr/>
+        </p:nvSpPr>
+        <p:spPr>
+          <a:xfrm>
+            <a:off x="4128176" y="3398284"/>
+            <a:ext cx="6088077" cy="1323439"/>
+          </a:xfrm>
+          <a:prstGeom prst="rect">
+            <a:avLst/>
+          </a:prstGeom>
+          <a:noFill/>
+        </p:spPr>
+        <p:txBody>
+          <a:bodyPr wrap="none" rtlCol="0">
+            <a:spAutoFit/>
+          </a:bodyPr>
+          <a:lstStyle/>
+          <a:p>
+            <a:r>
+              <a:rPr lang="fr-CA" sz="8000" noProof="1">
+                <a:solidFill>
+                  <a:schemeClr val="accent1"/>
+                </a:solidFill>
+                <a:latin typeface="Dubai Light" panose="020B0303030403030204" pitchFamily="34" charset="-78"/>
+                <a:cs typeface="Dubai Light" panose="020B0303030403030204" pitchFamily="34" charset="-78"/>
+              </a:rPr>
+              <a:t>kinetics toolkit</a:t>
+            </a:r>
+          </a:p>
+        </p:txBody>
+      </p:sp>
+      <p:sp>
+        <p:nvSpPr>
+          <p:cNvPr id="3" name="TextBox 2">
+            <a:extLst>
+              <a:ext uri="{FF2B5EF4-FFF2-40B4-BE49-F238E27FC236}">
+                <a16:creationId xmlns:a16="http://schemas.microsoft.com/office/drawing/2014/main" id="{1FA0AB9A-EE15-C84C-B155-30C5FE5B001D}"/>
+              </a:ext>
+            </a:extLst>
+          </p:cNvPr>
+          <p:cNvSpPr txBox="1"/>
+          <p:nvPr/>
+        </p:nvSpPr>
+        <p:spPr>
+          <a:xfrm>
+            <a:off x="4414087" y="4506621"/>
+            <a:ext cx="5516254" cy="646331"/>
+          </a:xfrm>
+          <a:prstGeom prst="rect">
+            <a:avLst/>
+          </a:prstGeom>
+          <a:noFill/>
+        </p:spPr>
+        <p:txBody>
+          <a:bodyPr wrap="none" rtlCol="0">
+            <a:spAutoFit/>
+          </a:bodyPr>
+          <a:lstStyle/>
+          <a:p>
+            <a:r>
+              <a:rPr lang="fr-CA" sz="3600" noProof="1">
+                <a:solidFill>
+                  <a:srgbClr val="92D050"/>
+                </a:solidFill>
+                <a:latin typeface="Aharoni" panose="02010803020104030203" pitchFamily="2" charset="-79"/>
+                <a:cs typeface="Aharoni" panose="02010803020104030203" pitchFamily="2" charset="-79"/>
+              </a:rPr>
+              <a:t>DEVELOPMENT VERSION</a:t>
+            </a:r>
+          </a:p>
+        </p:txBody>
+      </p:sp>
+    </p:spTree>
+    <p:extLst>
+      <p:ext uri="{BB962C8B-B14F-4D97-AF65-F5344CB8AC3E}">
+        <p14:creationId xmlns:p14="http://schemas.microsoft.com/office/powerpoint/2010/main" val="2168458935"/>
       </p:ext>
     </p:extLst>
   </p:cSld>

</xml_diff>

<commit_message>
[master] CLEAN Closes #29 - Move out DBInterface, explore, terminal, update
</commit_message>
<xml_diff>
--- a/logo.pptx
+++ b/logo.pptx
@@ -5,9 +5,10 @@
     <p:sldMasterId id="2147483648" r:id="rId1"/>
   </p:sldMasterIdLst>
   <p:sldIdLst>
-    <p:sldId id="256" r:id="rId2"/>
-    <p:sldId id="257" r:id="rId3"/>
+    <p:sldId id="257" r:id="rId2"/>
+    <p:sldId id="260" r:id="rId3"/>
     <p:sldId id="258" r:id="rId4"/>
+    <p:sldId id="261" r:id="rId5"/>
   </p:sldIdLst>
   <p:sldSz cx="12192000" cy="6858000"/>
   <p:notesSz cx="6858000" cy="9144000"/>
@@ -261,7 +262,7 @@
           <a:p>
             <a:fld id="{2DA01E9C-F9D9-044C-977D-997D3E353488}" type="datetimeFigureOut">
               <a:rPr lang="en-US" smtClean="0"/>
-              <a:t>3/3/21</a:t>
+              <a:t>5/27/21</a:t>
             </a:fld>
             <a:endParaRPr lang="en-US"/>
           </a:p>
@@ -459,7 +460,7 @@
           <a:p>
             <a:fld id="{2DA01E9C-F9D9-044C-977D-997D3E353488}" type="datetimeFigureOut">
               <a:rPr lang="en-US" smtClean="0"/>
-              <a:t>3/3/21</a:t>
+              <a:t>5/27/21</a:t>
             </a:fld>
             <a:endParaRPr lang="en-US"/>
           </a:p>
@@ -667,7 +668,7 @@
           <a:p>
             <a:fld id="{2DA01E9C-F9D9-044C-977D-997D3E353488}" type="datetimeFigureOut">
               <a:rPr lang="en-US" smtClean="0"/>
-              <a:t>3/3/21</a:t>
+              <a:t>5/27/21</a:t>
             </a:fld>
             <a:endParaRPr lang="en-US"/>
           </a:p>
@@ -865,7 +866,7 @@
           <a:p>
             <a:fld id="{2DA01E9C-F9D9-044C-977D-997D3E353488}" type="datetimeFigureOut">
               <a:rPr lang="en-US" smtClean="0"/>
-              <a:t>3/3/21</a:t>
+              <a:t>5/27/21</a:t>
             </a:fld>
             <a:endParaRPr lang="en-US"/>
           </a:p>
@@ -1140,7 +1141,7 @@
           <a:p>
             <a:fld id="{2DA01E9C-F9D9-044C-977D-997D3E353488}" type="datetimeFigureOut">
               <a:rPr lang="en-US" smtClean="0"/>
-              <a:t>3/3/21</a:t>
+              <a:t>5/27/21</a:t>
             </a:fld>
             <a:endParaRPr lang="en-US"/>
           </a:p>
@@ -1405,7 +1406,7 @@
           <a:p>
             <a:fld id="{2DA01E9C-F9D9-044C-977D-997D3E353488}" type="datetimeFigureOut">
               <a:rPr lang="en-US" smtClean="0"/>
-              <a:t>3/3/21</a:t>
+              <a:t>5/27/21</a:t>
             </a:fld>
             <a:endParaRPr lang="en-US"/>
           </a:p>
@@ -1817,7 +1818,7 @@
           <a:p>
             <a:fld id="{2DA01E9C-F9D9-044C-977D-997D3E353488}" type="datetimeFigureOut">
               <a:rPr lang="en-US" smtClean="0"/>
-              <a:t>3/3/21</a:t>
+              <a:t>5/27/21</a:t>
             </a:fld>
             <a:endParaRPr lang="en-US"/>
           </a:p>
@@ -1958,7 +1959,7 @@
           <a:p>
             <a:fld id="{2DA01E9C-F9D9-044C-977D-997D3E353488}" type="datetimeFigureOut">
               <a:rPr lang="en-US" smtClean="0"/>
-              <a:t>3/3/21</a:t>
+              <a:t>5/27/21</a:t>
             </a:fld>
             <a:endParaRPr lang="en-US"/>
           </a:p>
@@ -2071,7 +2072,7 @@
           <a:p>
             <a:fld id="{2DA01E9C-F9D9-044C-977D-997D3E353488}" type="datetimeFigureOut">
               <a:rPr lang="en-US" smtClean="0"/>
-              <a:t>3/3/21</a:t>
+              <a:t>5/27/21</a:t>
             </a:fld>
             <a:endParaRPr lang="en-US"/>
           </a:p>
@@ -2382,7 +2383,7 @@
           <a:p>
             <a:fld id="{2DA01E9C-F9D9-044C-977D-997D3E353488}" type="datetimeFigureOut">
               <a:rPr lang="en-US" smtClean="0"/>
-              <a:t>3/3/21</a:t>
+              <a:t>5/27/21</a:t>
             </a:fld>
             <a:endParaRPr lang="en-US"/>
           </a:p>
@@ -2670,7 +2671,7 @@
           <a:p>
             <a:fld id="{2DA01E9C-F9D9-044C-977D-997D3E353488}" type="datetimeFigureOut">
               <a:rPr lang="en-US" smtClean="0"/>
-              <a:t>3/3/21</a:t>
+              <a:t>5/27/21</a:t>
             </a:fld>
             <a:endParaRPr lang="en-US"/>
           </a:p>
@@ -2911,7 +2912,7 @@
           <a:p>
             <a:fld id="{2DA01E9C-F9D9-044C-977D-997D3E353488}" type="datetimeFigureOut">
               <a:rPr lang="en-US" smtClean="0"/>
-              <a:t>3/3/21</a:t>
+              <a:t>5/27/21</a:t>
             </a:fld>
             <a:endParaRPr lang="en-US"/>
           </a:p>
@@ -3349,347 +3350,7 @@
             <a:avLst/>
           </a:prstGeom>
           <a:solidFill>
-            <a:schemeClr val="accent6"/>
-          </a:solidFill>
-          <a:ln>
-            <a:noFill/>
-          </a:ln>
-          <a:effectLst>
-            <a:outerShdw blurRad="292100" dist="38100" dir="2700000" algn="tl" rotWithShape="0">
-              <a:prstClr val="black">
-                <a:alpha val="40000"/>
-              </a:prstClr>
-            </a:outerShdw>
-          </a:effectLst>
-        </p:spPr>
-        <p:style>
-          <a:lnRef idx="2">
-            <a:schemeClr val="accent1">
-              <a:shade val="50000"/>
-            </a:schemeClr>
-          </a:lnRef>
-          <a:fillRef idx="1">
-            <a:schemeClr val="accent1"/>
-          </a:fillRef>
-          <a:effectRef idx="0">
-            <a:schemeClr val="accent1"/>
-          </a:effectRef>
-          <a:fontRef idx="minor">
-            <a:schemeClr val="lt1"/>
-          </a:fontRef>
-        </p:style>
-        <p:txBody>
-          <a:bodyPr rtlCol="0" anchor="ctr"/>
-          <a:lstStyle/>
-          <a:p>
-            <a:pPr algn="ctr"/>
-            <a:endParaRPr lang="en-US"/>
-          </a:p>
-        </p:txBody>
-      </p:sp>
-      <p:sp>
-        <p:nvSpPr>
-          <p:cNvPr id="19" name="Parallelogram 18">
-            <a:extLst>
-              <a:ext uri="{FF2B5EF4-FFF2-40B4-BE49-F238E27FC236}">
-                <a16:creationId xmlns:a16="http://schemas.microsoft.com/office/drawing/2014/main" id="{F66D7793-8322-8842-B4F2-D33820E70762}"/>
-              </a:ext>
-            </a:extLst>
-          </p:cNvPr>
-          <p:cNvSpPr/>
-          <p:nvPr/>
-        </p:nvSpPr>
-        <p:spPr>
-          <a:xfrm flipV="1">
-            <a:off x="6833875" y="2676942"/>
-            <a:ext cx="1122620" cy="752058"/>
-          </a:xfrm>
-          <a:prstGeom prst="parallelogram">
-            <a:avLst>
-              <a:gd name="adj" fmla="val 85659"/>
-            </a:avLst>
-          </a:prstGeom>
-          <a:ln>
-            <a:noFill/>
-          </a:ln>
-          <a:effectLst>
-            <a:outerShdw blurRad="292100" dist="38100" dir="2700000" algn="tl" rotWithShape="0">
-              <a:prstClr val="black">
-                <a:alpha val="40000"/>
-              </a:prstClr>
-            </a:outerShdw>
-          </a:effectLst>
-        </p:spPr>
-        <p:style>
-          <a:lnRef idx="2">
-            <a:schemeClr val="accent1">
-              <a:shade val="50000"/>
-            </a:schemeClr>
-          </a:lnRef>
-          <a:fillRef idx="1">
-            <a:schemeClr val="accent1"/>
-          </a:fillRef>
-          <a:effectRef idx="0">
-            <a:schemeClr val="accent1"/>
-          </a:effectRef>
-          <a:fontRef idx="minor">
-            <a:schemeClr val="lt1"/>
-          </a:fontRef>
-        </p:style>
-        <p:txBody>
-          <a:bodyPr rtlCol="0" anchor="ctr"/>
-          <a:lstStyle/>
-          <a:p>
-            <a:pPr algn="ctr"/>
-            <a:endParaRPr lang="en-US"/>
-          </a:p>
-        </p:txBody>
-      </p:sp>
-      <p:sp>
-        <p:nvSpPr>
-          <p:cNvPr id="18" name="Parallelogram 17">
-            <a:extLst>
-              <a:ext uri="{FF2B5EF4-FFF2-40B4-BE49-F238E27FC236}">
-                <a16:creationId xmlns:a16="http://schemas.microsoft.com/office/drawing/2014/main" id="{F583D836-B8DA-094D-98B1-30DF81B29248}"/>
-              </a:ext>
-            </a:extLst>
-          </p:cNvPr>
-          <p:cNvSpPr/>
-          <p:nvPr/>
-        </p:nvSpPr>
-        <p:spPr>
-          <a:xfrm>
-            <a:off x="6833875" y="1924884"/>
-            <a:ext cx="1112110" cy="752058"/>
-          </a:xfrm>
-          <a:prstGeom prst="parallelogram">
-            <a:avLst>
-              <a:gd name="adj" fmla="val 84016"/>
-            </a:avLst>
-          </a:prstGeom>
-          <a:solidFill>
-            <a:srgbClr val="C00000"/>
-          </a:solidFill>
-          <a:ln>
-            <a:noFill/>
-          </a:ln>
-          <a:effectLst>
-            <a:outerShdw blurRad="292100" dist="38100" dir="2700000" algn="tl" rotWithShape="0">
-              <a:prstClr val="black">
-                <a:alpha val="40000"/>
-              </a:prstClr>
-            </a:outerShdw>
-          </a:effectLst>
-        </p:spPr>
-        <p:style>
-          <a:lnRef idx="2">
-            <a:schemeClr val="accent1">
-              <a:shade val="50000"/>
-            </a:schemeClr>
-          </a:lnRef>
-          <a:fillRef idx="1">
-            <a:schemeClr val="accent1"/>
-          </a:fillRef>
-          <a:effectRef idx="0">
-            <a:schemeClr val="accent1"/>
-          </a:effectRef>
-          <a:fontRef idx="minor">
-            <a:schemeClr val="lt1"/>
-          </a:fontRef>
-        </p:style>
-        <p:txBody>
-          <a:bodyPr rtlCol="0" anchor="ctr"/>
-          <a:lstStyle/>
-          <a:p>
-            <a:pPr algn="ctr"/>
-            <a:endParaRPr lang="en-US"/>
-          </a:p>
-        </p:txBody>
-      </p:sp>
-      <p:pic>
-        <p:nvPicPr>
-          <p:cNvPr id="3" name="Picture 2" descr="A close up of a sign&#10;&#10;Description automatically generated">
-            <a:extLst>
-              <a:ext uri="{FF2B5EF4-FFF2-40B4-BE49-F238E27FC236}">
-                <a16:creationId xmlns:a16="http://schemas.microsoft.com/office/drawing/2014/main" id="{F7D25E32-CD21-D140-829B-0ED1E14C5C47}"/>
-              </a:ext>
-            </a:extLst>
-          </p:cNvPr>
-          <p:cNvPicPr>
-            <a:picLocks noChangeAspect="1"/>
-          </p:cNvPicPr>
-          <p:nvPr/>
-        </p:nvPicPr>
-        <p:blipFill>
-          <a:blip r:embed="rId2">
-            <a:extLst>
-              <a:ext uri="{BEBA8EAE-BF5A-486C-A8C5-ECC9F3942E4B}">
-                <a14:imgProps xmlns:a14="http://schemas.microsoft.com/office/drawing/2010/main">
-                  <a14:imgLayer r:embed="rId3">
-                    <a14:imgEffect>
-                      <a14:backgroundRemoval t="10000" b="90000" l="10000" r="90000">
-                        <a14:foregroundMark x1="63542" y1="40066" x2="52431" y2="56623"/>
-                        <a14:foregroundMark x1="52778" y1="62914" x2="63889" y2="77815"/>
-                      </a14:backgroundRemoval>
-                    </a14:imgEffect>
-                  </a14:imgLayer>
-                </a14:imgProps>
-              </a:ext>
-            </a:extLst>
-          </a:blip>
-          <a:stretch>
-            <a:fillRect/>
-          </a:stretch>
-        </p:blipFill>
-        <p:spPr>
-          <a:xfrm>
-            <a:off x="-986638" y="1799981"/>
-            <a:ext cx="3657600" cy="3835400"/>
-          </a:xfrm>
-          <a:prstGeom prst="rect">
-            <a:avLst/>
-          </a:prstGeom>
-        </p:spPr>
-      </p:pic>
-      <p:sp>
-        <p:nvSpPr>
-          <p:cNvPr id="2" name="TextBox 1">
-            <a:extLst>
-              <a:ext uri="{FF2B5EF4-FFF2-40B4-BE49-F238E27FC236}">
-                <a16:creationId xmlns:a16="http://schemas.microsoft.com/office/drawing/2014/main" id="{DA28ED80-1720-D247-8B43-D0DEFB807ECD}"/>
-              </a:ext>
-            </a:extLst>
-          </p:cNvPr>
-          <p:cNvSpPr txBox="1"/>
-          <p:nvPr/>
-        </p:nvSpPr>
-        <p:spPr>
-          <a:xfrm>
-            <a:off x="4128176" y="3398284"/>
-            <a:ext cx="6088077" cy="1323439"/>
-          </a:xfrm>
-          <a:prstGeom prst="rect">
-            <a:avLst/>
-          </a:prstGeom>
-          <a:noFill/>
-        </p:spPr>
-        <p:txBody>
-          <a:bodyPr wrap="none" rtlCol="0">
-            <a:spAutoFit/>
-          </a:bodyPr>
-          <a:lstStyle/>
-          <a:p>
-            <a:r>
-              <a:rPr lang="fr-CA" sz="8000" noProof="1">
-                <a:solidFill>
-                  <a:schemeClr val="accent1"/>
-                </a:solidFill>
-                <a:latin typeface="Dubai Light" panose="020B0303030403030204" pitchFamily="34" charset="-78"/>
-                <a:cs typeface="Dubai Light" panose="020B0303030403030204" pitchFamily="34" charset="-78"/>
-              </a:rPr>
-              <a:t>kinetics toolkit</a:t>
-            </a:r>
-          </a:p>
-        </p:txBody>
-      </p:sp>
-    </p:spTree>
-    <p:extLst>
-      <p:ext uri="{BB962C8B-B14F-4D97-AF65-F5344CB8AC3E}">
-        <p14:creationId xmlns:p14="http://schemas.microsoft.com/office/powerpoint/2010/main" val="2928199461"/>
-      </p:ext>
-    </p:extLst>
-  </p:cSld>
-  <p:clrMapOvr>
-    <a:masterClrMapping/>
-  </p:clrMapOvr>
-</p:sld>
-</file>
-
-<file path=ppt/slides/slide2.xml><?xml version="1.0" encoding="utf-8"?>
-<p:sld xmlns:a="http://schemas.openxmlformats.org/drawingml/2006/main" xmlns:r="http://schemas.openxmlformats.org/officeDocument/2006/relationships" xmlns:p="http://schemas.openxmlformats.org/presentationml/2006/main">
-  <p:cSld>
-    <p:spTree>
-      <p:nvGrpSpPr>
-        <p:cNvPr id="1" name=""/>
-        <p:cNvGrpSpPr/>
-        <p:nvPr/>
-      </p:nvGrpSpPr>
-      <p:grpSpPr>
-        <a:xfrm>
-          <a:off x="0" y="0"/>
-          <a:ext cx="0" cy="0"/>
-          <a:chOff x="0" y="0"/>
-          <a:chExt cx="0" cy="0"/>
-        </a:xfrm>
-      </p:grpSpPr>
-      <p:sp>
-        <p:nvSpPr>
-          <p:cNvPr id="4" name="Rectangle 3">
-            <a:extLst>
-              <a:ext uri="{FF2B5EF4-FFF2-40B4-BE49-F238E27FC236}">
-                <a16:creationId xmlns:a16="http://schemas.microsoft.com/office/drawing/2014/main" id="{95447BEE-15A9-7847-94AF-22772F57986E}"/>
-              </a:ext>
-            </a:extLst>
-          </p:cNvPr>
-          <p:cNvSpPr/>
-          <p:nvPr/>
-        </p:nvSpPr>
-        <p:spPr>
-          <a:xfrm>
-            <a:off x="3000777" y="270456"/>
-            <a:ext cx="8718998" cy="4971245"/>
-          </a:xfrm>
-          <a:prstGeom prst="rect">
-            <a:avLst/>
-          </a:prstGeom>
-        </p:spPr>
-        <p:style>
-          <a:lnRef idx="2">
-            <a:schemeClr val="dk1">
-              <a:shade val="50000"/>
-            </a:schemeClr>
-          </a:lnRef>
-          <a:fillRef idx="1">
-            <a:schemeClr val="dk1"/>
-          </a:fillRef>
-          <a:effectRef idx="0">
-            <a:schemeClr val="dk1"/>
-          </a:effectRef>
-          <a:fontRef idx="minor">
-            <a:schemeClr val="lt1"/>
-          </a:fontRef>
-        </p:style>
-        <p:txBody>
-          <a:bodyPr rtlCol="0" anchor="ctr"/>
-          <a:lstStyle/>
-          <a:p>
-            <a:pPr algn="ctr"/>
-            <a:endParaRPr lang="fr-CA"/>
-          </a:p>
-        </p:txBody>
-      </p:sp>
-      <p:sp>
-        <p:nvSpPr>
-          <p:cNvPr id="20" name="Rectangle 19">
-            <a:extLst>
-              <a:ext uri="{FF2B5EF4-FFF2-40B4-BE49-F238E27FC236}">
-                <a16:creationId xmlns:a16="http://schemas.microsoft.com/office/drawing/2014/main" id="{FB8057E8-81B8-1F42-9B24-571399DB53E8}"/>
-              </a:ext>
-            </a:extLst>
-          </p:cNvPr>
-          <p:cNvSpPr/>
-          <p:nvPr/>
-        </p:nvSpPr>
-        <p:spPr>
-          <a:xfrm>
-            <a:off x="6401391" y="1245439"/>
-            <a:ext cx="432484" cy="2183561"/>
-          </a:xfrm>
-          <a:prstGeom prst="rect">
-            <a:avLst/>
-          </a:prstGeom>
-          <a:solidFill>
-            <a:srgbClr val="70AD47"/>
+            <a:srgbClr val="00B621"/>
           </a:solidFill>
           <a:ln>
             <a:noFill/>
@@ -3743,60 +3404,8 @@
               <a:gd name="adj" fmla="val 85659"/>
             </a:avLst>
           </a:prstGeom>
-          <a:ln>
-            <a:noFill/>
-          </a:ln>
-          <a:effectLst/>
-        </p:spPr>
-        <p:style>
-          <a:lnRef idx="2">
-            <a:schemeClr val="accent1">
-              <a:shade val="50000"/>
-            </a:schemeClr>
-          </a:lnRef>
-          <a:fillRef idx="1">
-            <a:schemeClr val="accent1"/>
-          </a:fillRef>
-          <a:effectRef idx="0">
-            <a:schemeClr val="accent1"/>
-          </a:effectRef>
-          <a:fontRef idx="minor">
-            <a:schemeClr val="lt1"/>
-          </a:fontRef>
-        </p:style>
-        <p:txBody>
-          <a:bodyPr rtlCol="0" anchor="ctr"/>
-          <a:lstStyle/>
-          <a:p>
-            <a:pPr algn="ctr"/>
-            <a:endParaRPr lang="en-US"/>
-          </a:p>
-        </p:txBody>
-      </p:sp>
-      <p:sp>
-        <p:nvSpPr>
-          <p:cNvPr id="18" name="Parallelogram 17">
-            <a:extLst>
-              <a:ext uri="{FF2B5EF4-FFF2-40B4-BE49-F238E27FC236}">
-                <a16:creationId xmlns:a16="http://schemas.microsoft.com/office/drawing/2014/main" id="{F583D836-B8DA-094D-98B1-30DF81B29248}"/>
-              </a:ext>
-            </a:extLst>
-          </p:cNvPr>
-          <p:cNvSpPr/>
-          <p:nvPr/>
-        </p:nvSpPr>
-        <p:spPr>
-          <a:xfrm>
-            <a:off x="6833875" y="1924884"/>
-            <a:ext cx="1112110" cy="752058"/>
-          </a:xfrm>
-          <a:prstGeom prst="parallelogram">
-            <a:avLst>
-              <a:gd name="adj" fmla="val 84016"/>
-            </a:avLst>
-          </a:prstGeom>
           <a:solidFill>
-            <a:srgbClr val="C00000"/>
+            <a:srgbClr val="0094FF"/>
           </a:solidFill>
           <a:ln>
             <a:noFill/>
@@ -3830,143 +3439,28 @@
       </p:sp>
       <p:sp>
         <p:nvSpPr>
-          <p:cNvPr id="2" name="TextBox 1">
-            <a:extLst>
-              <a:ext uri="{FF2B5EF4-FFF2-40B4-BE49-F238E27FC236}">
-                <a16:creationId xmlns:a16="http://schemas.microsoft.com/office/drawing/2014/main" id="{DA28ED80-1720-D247-8B43-D0DEFB807ECD}"/>
-              </a:ext>
-            </a:extLst>
-          </p:cNvPr>
-          <p:cNvSpPr txBox="1"/>
+          <p:cNvPr id="18" name="Parallelogram 17">
+            <a:extLst>
+              <a:ext uri="{FF2B5EF4-FFF2-40B4-BE49-F238E27FC236}">
+                <a16:creationId xmlns:a16="http://schemas.microsoft.com/office/drawing/2014/main" id="{F583D836-B8DA-094D-98B1-30DF81B29248}"/>
+              </a:ext>
+            </a:extLst>
+          </p:cNvPr>
+          <p:cNvSpPr/>
           <p:nvPr/>
         </p:nvSpPr>
         <p:spPr>
           <a:xfrm>
-            <a:off x="4128176" y="3398284"/>
-            <a:ext cx="6088077" cy="1323439"/>
+            <a:off x="6833875" y="1924884"/>
+            <a:ext cx="1112110" cy="752058"/>
           </a:xfrm>
-          <a:prstGeom prst="rect">
-            <a:avLst/>
-          </a:prstGeom>
-          <a:noFill/>
-        </p:spPr>
-        <p:txBody>
-          <a:bodyPr wrap="none" rtlCol="0">
-            <a:spAutoFit/>
-          </a:bodyPr>
-          <a:lstStyle/>
-          <a:p>
-            <a:r>
-              <a:rPr lang="fr-CA" sz="8000" noProof="1">
-                <a:solidFill>
-                  <a:schemeClr val="accent1"/>
-                </a:solidFill>
-                <a:latin typeface="Dubai Light" panose="020B0303030403030204" pitchFamily="34" charset="-78"/>
-                <a:cs typeface="Dubai Light" panose="020B0303030403030204" pitchFamily="34" charset="-78"/>
-              </a:rPr>
-              <a:t>kinetics toolkit</a:t>
-            </a:r>
-          </a:p>
-        </p:txBody>
-      </p:sp>
-    </p:spTree>
-    <p:extLst>
-      <p:ext uri="{BB962C8B-B14F-4D97-AF65-F5344CB8AC3E}">
-        <p14:creationId xmlns:p14="http://schemas.microsoft.com/office/powerpoint/2010/main" val="2086189609"/>
-      </p:ext>
-    </p:extLst>
-  </p:cSld>
-  <p:clrMapOvr>
-    <a:masterClrMapping/>
-  </p:clrMapOvr>
-</p:sld>
-</file>
-
-<file path=ppt/slides/slide3.xml><?xml version="1.0" encoding="utf-8"?>
-<p:sld xmlns:a="http://schemas.openxmlformats.org/drawingml/2006/main" xmlns:r="http://schemas.openxmlformats.org/officeDocument/2006/relationships" xmlns:p="http://schemas.openxmlformats.org/presentationml/2006/main">
-  <p:cSld>
-    <p:spTree>
-      <p:nvGrpSpPr>
-        <p:cNvPr id="1" name=""/>
-        <p:cNvGrpSpPr/>
-        <p:nvPr/>
-      </p:nvGrpSpPr>
-      <p:grpSpPr>
-        <a:xfrm>
-          <a:off x="0" y="0"/>
-          <a:ext cx="0" cy="0"/>
-          <a:chOff x="0" y="0"/>
-          <a:chExt cx="0" cy="0"/>
-        </a:xfrm>
-      </p:grpSpPr>
-      <p:sp>
-        <p:nvSpPr>
-          <p:cNvPr id="4" name="Rectangle 3">
-            <a:extLst>
-              <a:ext uri="{FF2B5EF4-FFF2-40B4-BE49-F238E27FC236}">
-                <a16:creationId xmlns:a16="http://schemas.microsoft.com/office/drawing/2014/main" id="{95447BEE-15A9-7847-94AF-22772F57986E}"/>
-              </a:ext>
-            </a:extLst>
-          </p:cNvPr>
-          <p:cNvSpPr/>
-          <p:nvPr/>
-        </p:nvSpPr>
-        <p:spPr>
-          <a:xfrm>
-            <a:off x="3000777" y="270456"/>
-            <a:ext cx="8718998" cy="6489267"/>
-          </a:xfrm>
-          <a:prstGeom prst="rect">
-            <a:avLst/>
-          </a:prstGeom>
-        </p:spPr>
-        <p:style>
-          <a:lnRef idx="2">
-            <a:schemeClr val="dk1">
-              <a:shade val="50000"/>
-            </a:schemeClr>
-          </a:lnRef>
-          <a:fillRef idx="1">
-            <a:schemeClr val="dk1"/>
-          </a:fillRef>
-          <a:effectRef idx="0">
-            <a:schemeClr val="dk1"/>
-          </a:effectRef>
-          <a:fontRef idx="minor">
-            <a:schemeClr val="lt1"/>
-          </a:fontRef>
-        </p:style>
-        <p:txBody>
-          <a:bodyPr rtlCol="0" anchor="ctr"/>
-          <a:lstStyle/>
-          <a:p>
-            <a:pPr algn="ctr"/>
-            <a:endParaRPr lang="fr-CA" noProof="1"/>
-          </a:p>
-        </p:txBody>
-      </p:sp>
-      <p:sp>
-        <p:nvSpPr>
-          <p:cNvPr id="20" name="Rectangle 19">
-            <a:extLst>
-              <a:ext uri="{FF2B5EF4-FFF2-40B4-BE49-F238E27FC236}">
-                <a16:creationId xmlns:a16="http://schemas.microsoft.com/office/drawing/2014/main" id="{FB8057E8-81B8-1F42-9B24-571399DB53E8}"/>
-              </a:ext>
-            </a:extLst>
-          </p:cNvPr>
-          <p:cNvSpPr/>
-          <p:nvPr/>
-        </p:nvSpPr>
-        <p:spPr>
-          <a:xfrm>
-            <a:off x="6401391" y="1245439"/>
-            <a:ext cx="432484" cy="2183561"/>
-          </a:xfrm>
-          <a:prstGeom prst="rect">
-            <a:avLst/>
+          <a:prstGeom prst="parallelogram">
+            <a:avLst>
+              <a:gd name="adj" fmla="val 84016"/>
+            </a:avLst>
           </a:prstGeom>
           <a:solidFill>
-            <a:srgbClr val="70AD47"/>
+            <a:srgbClr val="FF0000"/>
           </a:solidFill>
           <a:ln>
             <a:noFill/>
@@ -3994,16 +3488,57 @@
           <a:lstStyle/>
           <a:p>
             <a:pPr algn="ctr"/>
-            <a:endParaRPr lang="en-US" noProof="1"/>
-          </a:p>
-        </p:txBody>
-      </p:sp>
-      <p:sp>
-        <p:nvSpPr>
-          <p:cNvPr id="19" name="Parallelogram 18">
-            <a:extLst>
-              <a:ext uri="{FF2B5EF4-FFF2-40B4-BE49-F238E27FC236}">
-                <a16:creationId xmlns:a16="http://schemas.microsoft.com/office/drawing/2014/main" id="{F66D7793-8322-8842-B4F2-D33820E70762}"/>
+            <a:endParaRPr lang="en-US"/>
+          </a:p>
+        </p:txBody>
+      </p:sp>
+      <p:sp>
+        <p:nvSpPr>
+          <p:cNvPr id="2" name="TextBox 1">
+            <a:extLst>
+              <a:ext uri="{FF2B5EF4-FFF2-40B4-BE49-F238E27FC236}">
+                <a16:creationId xmlns:a16="http://schemas.microsoft.com/office/drawing/2014/main" id="{DA28ED80-1720-D247-8B43-D0DEFB807ECD}"/>
+              </a:ext>
+            </a:extLst>
+          </p:cNvPr>
+          <p:cNvSpPr txBox="1"/>
+          <p:nvPr/>
+        </p:nvSpPr>
+        <p:spPr>
+          <a:xfrm>
+            <a:off x="4128176" y="3398284"/>
+            <a:ext cx="6088077" cy="1323439"/>
+          </a:xfrm>
+          <a:prstGeom prst="rect">
+            <a:avLst/>
+          </a:prstGeom>
+          <a:noFill/>
+        </p:spPr>
+        <p:txBody>
+          <a:bodyPr wrap="none" rtlCol="0">
+            <a:spAutoFit/>
+          </a:bodyPr>
+          <a:lstStyle/>
+          <a:p>
+            <a:r>
+              <a:rPr lang="fr-CA" sz="8000" noProof="1">
+                <a:solidFill>
+                  <a:srgbClr val="0081DE"/>
+                </a:solidFill>
+                <a:latin typeface="Dubai Light" panose="020B0303030403030204" pitchFamily="34" charset="-78"/>
+                <a:cs typeface="Dubai Light" panose="020B0303030403030204" pitchFamily="34" charset="-78"/>
+              </a:rPr>
+              <a:t>kinetics toolkit</a:t>
+            </a:r>
+          </a:p>
+        </p:txBody>
+      </p:sp>
+      <p:sp>
+        <p:nvSpPr>
+          <p:cNvPr id="7" name="Rectangle 6">
+            <a:extLst>
+              <a:ext uri="{FF2B5EF4-FFF2-40B4-BE49-F238E27FC236}">
+                <a16:creationId xmlns:a16="http://schemas.microsoft.com/office/drawing/2014/main" id="{7D972B0C-E026-E34A-9E8B-0DAB5356C6DD}"/>
               </a:ext>
             </a:extLst>
           </p:cNvPr>
@@ -4011,34 +3546,30 @@
           <p:nvPr/>
         </p:nvSpPr>
         <p:spPr>
-          <a:xfrm flipV="1">
-            <a:off x="6833875" y="2676942"/>
-            <a:ext cx="1122620" cy="752058"/>
+          <a:xfrm>
+            <a:off x="3326130" y="640080"/>
+            <a:ext cx="7578090" cy="4297680"/>
           </a:xfrm>
-          <a:prstGeom prst="parallelogram">
-            <a:avLst>
-              <a:gd name="adj" fmla="val 85659"/>
-            </a:avLst>
+          <a:prstGeom prst="rect">
+            <a:avLst/>
           </a:prstGeom>
+          <a:noFill/>
           <a:ln>
             <a:noFill/>
           </a:ln>
-          <a:effectLst/>
         </p:spPr>
         <p:style>
           <a:lnRef idx="2">
-            <a:schemeClr val="accent1">
-              <a:shade val="50000"/>
-            </a:schemeClr>
+            <a:schemeClr val="dk1"/>
           </a:lnRef>
           <a:fillRef idx="1">
-            <a:schemeClr val="accent1"/>
+            <a:schemeClr val="lt1"/>
           </a:fillRef>
           <a:effectRef idx="0">
-            <a:schemeClr val="accent1"/>
+            <a:schemeClr val="dk1"/>
           </a:effectRef>
           <a:fontRef idx="minor">
-            <a:schemeClr val="lt1"/>
+            <a:schemeClr val="dk1"/>
           </a:fontRef>
         </p:style>
         <p:txBody>
@@ -4046,16 +3577,54 @@
           <a:lstStyle/>
           <a:p>
             <a:pPr algn="ctr"/>
-            <a:endParaRPr lang="en-US" noProof="1"/>
-          </a:p>
-        </p:txBody>
-      </p:sp>
-      <p:sp>
-        <p:nvSpPr>
-          <p:cNvPr id="18" name="Parallelogram 17">
-            <a:extLst>
-              <a:ext uri="{FF2B5EF4-FFF2-40B4-BE49-F238E27FC236}">
-                <a16:creationId xmlns:a16="http://schemas.microsoft.com/office/drawing/2014/main" id="{F583D836-B8DA-094D-98B1-30DF81B29248}"/>
+            <a:endParaRPr lang="fr-CA"/>
+          </a:p>
+        </p:txBody>
+      </p:sp>
+    </p:spTree>
+    <p:extLst>
+      <p:ext uri="{BB962C8B-B14F-4D97-AF65-F5344CB8AC3E}">
+        <p14:creationId xmlns:p14="http://schemas.microsoft.com/office/powerpoint/2010/main" val="2086189609"/>
+      </p:ext>
+    </p:extLst>
+  </p:cSld>
+  <p:clrMapOvr>
+    <a:masterClrMapping/>
+  </p:clrMapOvr>
+</p:sld>
+</file>
+
+<file path=ppt/slides/slide2.xml><?xml version="1.0" encoding="utf-8"?>
+<p:sld xmlns:a="http://schemas.openxmlformats.org/drawingml/2006/main" xmlns:r="http://schemas.openxmlformats.org/officeDocument/2006/relationships" xmlns:p="http://schemas.openxmlformats.org/presentationml/2006/main">
+  <p:cSld>
+    <p:bg>
+      <p:bgPr>
+        <a:solidFill>
+          <a:schemeClr val="tx1"/>
+        </a:solidFill>
+        <a:effectLst/>
+      </p:bgPr>
+    </p:bg>
+    <p:spTree>
+      <p:nvGrpSpPr>
+        <p:cNvPr id="1" name=""/>
+        <p:cNvGrpSpPr/>
+        <p:nvPr/>
+      </p:nvGrpSpPr>
+      <p:grpSpPr>
+        <a:xfrm>
+          <a:off x="0" y="0"/>
+          <a:ext cx="0" cy="0"/>
+          <a:chOff x="0" y="0"/>
+          <a:chExt cx="0" cy="0"/>
+        </a:xfrm>
+      </p:grpSpPr>
+      <p:sp>
+        <p:nvSpPr>
+          <p:cNvPr id="20" name="Rectangle 19">
+            <a:extLst>
+              <a:ext uri="{FF2B5EF4-FFF2-40B4-BE49-F238E27FC236}">
+                <a16:creationId xmlns:a16="http://schemas.microsoft.com/office/drawing/2014/main" id="{FB8057E8-81B8-1F42-9B24-571399DB53E8}"/>
               </a:ext>
             </a:extLst>
           </p:cNvPr>
@@ -4064,16 +3633,14 @@
         </p:nvSpPr>
         <p:spPr>
           <a:xfrm>
-            <a:off x="6833875" y="1924884"/>
-            <a:ext cx="1112110" cy="752058"/>
+            <a:off x="6401391" y="1245439"/>
+            <a:ext cx="432484" cy="2183561"/>
           </a:xfrm>
-          <a:prstGeom prst="parallelogram">
-            <a:avLst>
-              <a:gd name="adj" fmla="val 84016"/>
-            </a:avLst>
+          <a:prstGeom prst="rect">
+            <a:avLst/>
           </a:prstGeom>
           <a:solidFill>
-            <a:srgbClr val="C00000"/>
+            <a:srgbClr val="00B621"/>
           </a:solidFill>
           <a:ln>
             <a:noFill/>
@@ -4101,7 +3668,117 @@
           <a:lstStyle/>
           <a:p>
             <a:pPr algn="ctr"/>
-            <a:endParaRPr lang="en-US" noProof="1"/>
+            <a:endParaRPr lang="en-US"/>
+          </a:p>
+        </p:txBody>
+      </p:sp>
+      <p:sp>
+        <p:nvSpPr>
+          <p:cNvPr id="19" name="Parallelogram 18">
+            <a:extLst>
+              <a:ext uri="{FF2B5EF4-FFF2-40B4-BE49-F238E27FC236}">
+                <a16:creationId xmlns:a16="http://schemas.microsoft.com/office/drawing/2014/main" id="{F66D7793-8322-8842-B4F2-D33820E70762}"/>
+              </a:ext>
+            </a:extLst>
+          </p:cNvPr>
+          <p:cNvSpPr/>
+          <p:nvPr/>
+        </p:nvSpPr>
+        <p:spPr>
+          <a:xfrm flipV="1">
+            <a:off x="6833875" y="2676942"/>
+            <a:ext cx="1122620" cy="752058"/>
+          </a:xfrm>
+          <a:prstGeom prst="parallelogram">
+            <a:avLst>
+              <a:gd name="adj" fmla="val 85659"/>
+            </a:avLst>
+          </a:prstGeom>
+          <a:solidFill>
+            <a:srgbClr val="0094FF"/>
+          </a:solidFill>
+          <a:ln>
+            <a:noFill/>
+          </a:ln>
+          <a:effectLst/>
+        </p:spPr>
+        <p:style>
+          <a:lnRef idx="2">
+            <a:schemeClr val="accent1">
+              <a:shade val="50000"/>
+            </a:schemeClr>
+          </a:lnRef>
+          <a:fillRef idx="1">
+            <a:schemeClr val="accent1"/>
+          </a:fillRef>
+          <a:effectRef idx="0">
+            <a:schemeClr val="accent1"/>
+          </a:effectRef>
+          <a:fontRef idx="minor">
+            <a:schemeClr val="lt1"/>
+          </a:fontRef>
+        </p:style>
+        <p:txBody>
+          <a:bodyPr rtlCol="0" anchor="ctr"/>
+          <a:lstStyle/>
+          <a:p>
+            <a:pPr algn="ctr"/>
+            <a:endParaRPr lang="en-US"/>
+          </a:p>
+        </p:txBody>
+      </p:sp>
+      <p:sp>
+        <p:nvSpPr>
+          <p:cNvPr id="18" name="Parallelogram 17">
+            <a:extLst>
+              <a:ext uri="{FF2B5EF4-FFF2-40B4-BE49-F238E27FC236}">
+                <a16:creationId xmlns:a16="http://schemas.microsoft.com/office/drawing/2014/main" id="{F583D836-B8DA-094D-98B1-30DF81B29248}"/>
+              </a:ext>
+            </a:extLst>
+          </p:cNvPr>
+          <p:cNvSpPr/>
+          <p:nvPr/>
+        </p:nvSpPr>
+        <p:spPr>
+          <a:xfrm>
+            <a:off x="6833875" y="1924884"/>
+            <a:ext cx="1112110" cy="752058"/>
+          </a:xfrm>
+          <a:prstGeom prst="parallelogram">
+            <a:avLst>
+              <a:gd name="adj" fmla="val 84016"/>
+            </a:avLst>
+          </a:prstGeom>
+          <a:solidFill>
+            <a:srgbClr val="FF0000"/>
+          </a:solidFill>
+          <a:ln>
+            <a:noFill/>
+          </a:ln>
+          <a:effectLst/>
+        </p:spPr>
+        <p:style>
+          <a:lnRef idx="2">
+            <a:schemeClr val="accent1">
+              <a:shade val="50000"/>
+            </a:schemeClr>
+          </a:lnRef>
+          <a:fillRef idx="1">
+            <a:schemeClr val="accent1"/>
+          </a:fillRef>
+          <a:effectRef idx="0">
+            <a:schemeClr val="accent1"/>
+          </a:effectRef>
+          <a:fontRef idx="minor">
+            <a:schemeClr val="lt1"/>
+          </a:fontRef>
+        </p:style>
+        <p:txBody>
+          <a:bodyPr rtlCol="0" anchor="ctr"/>
+          <a:lstStyle/>
+          <a:p>
+            <a:pPr algn="ctr"/>
+            <a:endParaRPr lang="en-US"/>
           </a:p>
         </p:txBody>
       </p:sp>
@@ -4136,7 +3813,305 @@
             <a:r>
               <a:rPr lang="fr-CA" sz="8000" noProof="1">
                 <a:solidFill>
-                  <a:schemeClr val="accent1"/>
+                  <a:srgbClr val="55A5D9"/>
+                </a:solidFill>
+                <a:latin typeface="Dubai Light" panose="020B0303030403030204" pitchFamily="34" charset="-78"/>
+                <a:cs typeface="Dubai Light" panose="020B0303030403030204" pitchFamily="34" charset="-78"/>
+              </a:rPr>
+              <a:t>kinetics toolkit</a:t>
+            </a:r>
+          </a:p>
+        </p:txBody>
+      </p:sp>
+      <p:sp>
+        <p:nvSpPr>
+          <p:cNvPr id="7" name="Rectangle 6">
+            <a:extLst>
+              <a:ext uri="{FF2B5EF4-FFF2-40B4-BE49-F238E27FC236}">
+                <a16:creationId xmlns:a16="http://schemas.microsoft.com/office/drawing/2014/main" id="{FD52AA5F-6288-FA4F-B7B8-8D9FB81608E3}"/>
+              </a:ext>
+            </a:extLst>
+          </p:cNvPr>
+          <p:cNvSpPr/>
+          <p:nvPr/>
+        </p:nvSpPr>
+        <p:spPr>
+          <a:xfrm>
+            <a:off x="3326130" y="640080"/>
+            <a:ext cx="7578090" cy="4297680"/>
+          </a:xfrm>
+          <a:prstGeom prst="rect">
+            <a:avLst/>
+          </a:prstGeom>
+          <a:noFill/>
+          <a:ln>
+            <a:noFill/>
+          </a:ln>
+        </p:spPr>
+        <p:style>
+          <a:lnRef idx="2">
+            <a:schemeClr val="dk1"/>
+          </a:lnRef>
+          <a:fillRef idx="1">
+            <a:schemeClr val="lt1"/>
+          </a:fillRef>
+          <a:effectRef idx="0">
+            <a:schemeClr val="dk1"/>
+          </a:effectRef>
+          <a:fontRef idx="minor">
+            <a:schemeClr val="dk1"/>
+          </a:fontRef>
+        </p:style>
+        <p:txBody>
+          <a:bodyPr rtlCol="0" anchor="ctr"/>
+          <a:lstStyle/>
+          <a:p>
+            <a:pPr algn="ctr"/>
+            <a:endParaRPr lang="fr-CA"/>
+          </a:p>
+        </p:txBody>
+      </p:sp>
+    </p:spTree>
+    <p:extLst>
+      <p:ext uri="{BB962C8B-B14F-4D97-AF65-F5344CB8AC3E}">
+        <p14:creationId xmlns:p14="http://schemas.microsoft.com/office/powerpoint/2010/main" val="1136522241"/>
+      </p:ext>
+    </p:extLst>
+  </p:cSld>
+  <p:clrMapOvr>
+    <a:masterClrMapping/>
+  </p:clrMapOvr>
+</p:sld>
+</file>
+
+<file path=ppt/slides/slide3.xml><?xml version="1.0" encoding="utf-8"?>
+<p:sld xmlns:a="http://schemas.openxmlformats.org/drawingml/2006/main" xmlns:r="http://schemas.openxmlformats.org/officeDocument/2006/relationships" xmlns:p="http://schemas.openxmlformats.org/presentationml/2006/main">
+  <p:cSld>
+    <p:bg>
+      <p:bgPr>
+        <a:solidFill>
+          <a:schemeClr val="tx1"/>
+        </a:solidFill>
+        <a:effectLst/>
+      </p:bgPr>
+    </p:bg>
+    <p:spTree>
+      <p:nvGrpSpPr>
+        <p:cNvPr id="1" name=""/>
+        <p:cNvGrpSpPr/>
+        <p:nvPr/>
+      </p:nvGrpSpPr>
+      <p:grpSpPr>
+        <a:xfrm>
+          <a:off x="0" y="0"/>
+          <a:ext cx="0" cy="0"/>
+          <a:chOff x="0" y="0"/>
+          <a:chExt cx="0" cy="0"/>
+        </a:xfrm>
+      </p:grpSpPr>
+      <p:sp>
+        <p:nvSpPr>
+          <p:cNvPr id="20" name="Rectangle 19">
+            <a:extLst>
+              <a:ext uri="{FF2B5EF4-FFF2-40B4-BE49-F238E27FC236}">
+                <a16:creationId xmlns:a16="http://schemas.microsoft.com/office/drawing/2014/main" id="{FB8057E8-81B8-1F42-9B24-571399DB53E8}"/>
+              </a:ext>
+            </a:extLst>
+          </p:cNvPr>
+          <p:cNvSpPr/>
+          <p:nvPr/>
+        </p:nvSpPr>
+        <p:spPr>
+          <a:xfrm>
+            <a:off x="6401391" y="1245439"/>
+            <a:ext cx="432484" cy="2183561"/>
+          </a:xfrm>
+          <a:prstGeom prst="rect">
+            <a:avLst/>
+          </a:prstGeom>
+          <a:solidFill>
+            <a:schemeClr val="bg1"/>
+          </a:solidFill>
+          <a:ln>
+            <a:noFill/>
+          </a:ln>
+          <a:effectLst/>
+        </p:spPr>
+        <p:style>
+          <a:lnRef idx="2">
+            <a:schemeClr val="accent1">
+              <a:shade val="50000"/>
+            </a:schemeClr>
+          </a:lnRef>
+          <a:fillRef idx="1">
+            <a:schemeClr val="accent1"/>
+          </a:fillRef>
+          <a:effectRef idx="0">
+            <a:schemeClr val="accent1"/>
+          </a:effectRef>
+          <a:fontRef idx="minor">
+            <a:schemeClr val="lt1"/>
+          </a:fontRef>
+        </p:style>
+        <p:txBody>
+          <a:bodyPr rtlCol="0" anchor="ctr"/>
+          <a:lstStyle/>
+          <a:p>
+            <a:pPr algn="ctr"/>
+            <a:endParaRPr lang="en-US" noProof="1">
+              <a:solidFill>
+                <a:schemeClr val="bg1"/>
+              </a:solidFill>
+            </a:endParaRPr>
+          </a:p>
+        </p:txBody>
+      </p:sp>
+      <p:sp>
+        <p:nvSpPr>
+          <p:cNvPr id="19" name="Parallelogram 18">
+            <a:extLst>
+              <a:ext uri="{FF2B5EF4-FFF2-40B4-BE49-F238E27FC236}">
+                <a16:creationId xmlns:a16="http://schemas.microsoft.com/office/drawing/2014/main" id="{F66D7793-8322-8842-B4F2-D33820E70762}"/>
+              </a:ext>
+            </a:extLst>
+          </p:cNvPr>
+          <p:cNvSpPr/>
+          <p:nvPr/>
+        </p:nvSpPr>
+        <p:spPr>
+          <a:xfrm flipV="1">
+            <a:off x="6833875" y="2676942"/>
+            <a:ext cx="1122620" cy="752058"/>
+          </a:xfrm>
+          <a:prstGeom prst="parallelogram">
+            <a:avLst>
+              <a:gd name="adj" fmla="val 85659"/>
+            </a:avLst>
+          </a:prstGeom>
+          <a:solidFill>
+            <a:schemeClr val="bg1">
+              <a:lumMod val="65000"/>
+            </a:schemeClr>
+          </a:solidFill>
+          <a:ln>
+            <a:noFill/>
+          </a:ln>
+          <a:effectLst/>
+        </p:spPr>
+        <p:style>
+          <a:lnRef idx="2">
+            <a:schemeClr val="accent1">
+              <a:shade val="50000"/>
+            </a:schemeClr>
+          </a:lnRef>
+          <a:fillRef idx="1">
+            <a:schemeClr val="accent1"/>
+          </a:fillRef>
+          <a:effectRef idx="0">
+            <a:schemeClr val="accent1"/>
+          </a:effectRef>
+          <a:fontRef idx="minor">
+            <a:schemeClr val="lt1"/>
+          </a:fontRef>
+        </p:style>
+        <p:txBody>
+          <a:bodyPr rtlCol="0" anchor="ctr"/>
+          <a:lstStyle/>
+          <a:p>
+            <a:pPr algn="ctr"/>
+            <a:endParaRPr lang="en-US" noProof="1"/>
+          </a:p>
+        </p:txBody>
+      </p:sp>
+      <p:sp>
+        <p:nvSpPr>
+          <p:cNvPr id="18" name="Parallelogram 17">
+            <a:extLst>
+              <a:ext uri="{FF2B5EF4-FFF2-40B4-BE49-F238E27FC236}">
+                <a16:creationId xmlns:a16="http://schemas.microsoft.com/office/drawing/2014/main" id="{F583D836-B8DA-094D-98B1-30DF81B29248}"/>
+              </a:ext>
+            </a:extLst>
+          </p:cNvPr>
+          <p:cNvSpPr/>
+          <p:nvPr/>
+        </p:nvSpPr>
+        <p:spPr>
+          <a:xfrm>
+            <a:off x="6833875" y="1924884"/>
+            <a:ext cx="1112110" cy="752058"/>
+          </a:xfrm>
+          <a:prstGeom prst="parallelogram">
+            <a:avLst>
+              <a:gd name="adj" fmla="val 84016"/>
+            </a:avLst>
+          </a:prstGeom>
+          <a:solidFill>
+            <a:schemeClr val="bg1">
+              <a:lumMod val="85000"/>
+            </a:schemeClr>
+          </a:solidFill>
+          <a:ln>
+            <a:noFill/>
+          </a:ln>
+          <a:effectLst/>
+        </p:spPr>
+        <p:style>
+          <a:lnRef idx="2">
+            <a:schemeClr val="accent1">
+              <a:shade val="50000"/>
+            </a:schemeClr>
+          </a:lnRef>
+          <a:fillRef idx="1">
+            <a:schemeClr val="accent1"/>
+          </a:fillRef>
+          <a:effectRef idx="0">
+            <a:schemeClr val="accent1"/>
+          </a:effectRef>
+          <a:fontRef idx="minor">
+            <a:schemeClr val="lt1"/>
+          </a:fontRef>
+        </p:style>
+        <p:txBody>
+          <a:bodyPr rtlCol="0" anchor="ctr"/>
+          <a:lstStyle/>
+          <a:p>
+            <a:pPr algn="ctr"/>
+            <a:endParaRPr lang="en-US" noProof="1"/>
+          </a:p>
+        </p:txBody>
+      </p:sp>
+      <p:sp>
+        <p:nvSpPr>
+          <p:cNvPr id="2" name="TextBox 1">
+            <a:extLst>
+              <a:ext uri="{FF2B5EF4-FFF2-40B4-BE49-F238E27FC236}">
+                <a16:creationId xmlns:a16="http://schemas.microsoft.com/office/drawing/2014/main" id="{DA28ED80-1720-D247-8B43-D0DEFB807ECD}"/>
+              </a:ext>
+            </a:extLst>
+          </p:cNvPr>
+          <p:cNvSpPr txBox="1"/>
+          <p:nvPr/>
+        </p:nvSpPr>
+        <p:spPr>
+          <a:xfrm>
+            <a:off x="4128176" y="3398284"/>
+            <a:ext cx="6088077" cy="1323439"/>
+          </a:xfrm>
+          <a:prstGeom prst="rect">
+            <a:avLst/>
+          </a:prstGeom>
+          <a:noFill/>
+        </p:spPr>
+        <p:txBody>
+          <a:bodyPr wrap="none" rtlCol="0">
+            <a:spAutoFit/>
+          </a:bodyPr>
+          <a:lstStyle/>
+          <a:p>
+            <a:r>
+              <a:rPr lang="fr-CA" sz="8000" noProof="1">
+                <a:solidFill>
+                  <a:schemeClr val="bg1"/>
                 </a:solidFill>
                 <a:latin typeface="Dubai Light" panose="020B0303030403030204" pitchFamily="34" charset="-78"/>
                 <a:cs typeface="Dubai Light" panose="020B0303030403030204" pitchFamily="34" charset="-78"/>
@@ -4177,7 +4152,7 @@
             <a:r>
               <a:rPr lang="fr-CA" sz="3600" noProof="1">
                 <a:solidFill>
-                  <a:srgbClr val="92D050"/>
+                  <a:srgbClr val="C00000"/>
                 </a:solidFill>
                 <a:latin typeface="Aharoni" panose="02010803020104030203" pitchFamily="2" charset="-79"/>
                 <a:cs typeface="Aharoni" panose="02010803020104030203" pitchFamily="2" charset="-79"/>
@@ -4187,10 +4162,299 @@
           </a:p>
         </p:txBody>
       </p:sp>
+      <p:sp>
+        <p:nvSpPr>
+          <p:cNvPr id="8" name="Rectangle 7">
+            <a:extLst>
+              <a:ext uri="{FF2B5EF4-FFF2-40B4-BE49-F238E27FC236}">
+                <a16:creationId xmlns:a16="http://schemas.microsoft.com/office/drawing/2014/main" id="{6111701A-369E-0E46-9FC0-816CE95CDB8A}"/>
+              </a:ext>
+            </a:extLst>
+          </p:cNvPr>
+          <p:cNvSpPr/>
+          <p:nvPr/>
+        </p:nvSpPr>
+        <p:spPr>
+          <a:xfrm>
+            <a:off x="3326130" y="640079"/>
+            <a:ext cx="7578090" cy="4734353"/>
+          </a:xfrm>
+          <a:prstGeom prst="rect">
+            <a:avLst/>
+          </a:prstGeom>
+          <a:noFill/>
+          <a:ln>
+            <a:noFill/>
+          </a:ln>
+        </p:spPr>
+        <p:style>
+          <a:lnRef idx="2">
+            <a:schemeClr val="dk1"/>
+          </a:lnRef>
+          <a:fillRef idx="1">
+            <a:schemeClr val="lt1"/>
+          </a:fillRef>
+          <a:effectRef idx="0">
+            <a:schemeClr val="dk1"/>
+          </a:effectRef>
+          <a:fontRef idx="minor">
+            <a:schemeClr val="dk1"/>
+          </a:fontRef>
+        </p:style>
+        <p:txBody>
+          <a:bodyPr rtlCol="0" anchor="ctr"/>
+          <a:lstStyle/>
+          <a:p>
+            <a:pPr algn="ctr"/>
+            <a:endParaRPr lang="fr-CA"/>
+          </a:p>
+        </p:txBody>
+      </p:sp>
     </p:spTree>
     <p:extLst>
       <p:ext uri="{BB962C8B-B14F-4D97-AF65-F5344CB8AC3E}">
         <p14:creationId xmlns:p14="http://schemas.microsoft.com/office/powerpoint/2010/main" val="2168458935"/>
+      </p:ext>
+    </p:extLst>
+  </p:cSld>
+  <p:clrMapOvr>
+    <a:masterClrMapping/>
+  </p:clrMapOvr>
+</p:sld>
+</file>
+
+<file path=ppt/slides/slide4.xml><?xml version="1.0" encoding="utf-8"?>
+<p:sld xmlns:a="http://schemas.openxmlformats.org/drawingml/2006/main" xmlns:r="http://schemas.openxmlformats.org/officeDocument/2006/relationships" xmlns:p="http://schemas.openxmlformats.org/presentationml/2006/main">
+  <p:cSld>
+    <p:spTree>
+      <p:nvGrpSpPr>
+        <p:cNvPr id="1" name=""/>
+        <p:cNvGrpSpPr/>
+        <p:nvPr/>
+      </p:nvGrpSpPr>
+      <p:grpSpPr>
+        <a:xfrm>
+          <a:off x="0" y="0"/>
+          <a:ext cx="0" cy="0"/>
+          <a:chOff x="0" y="0"/>
+          <a:chExt cx="0" cy="0"/>
+        </a:xfrm>
+      </p:grpSpPr>
+      <p:sp>
+        <p:nvSpPr>
+          <p:cNvPr id="20" name="Rectangle 19">
+            <a:extLst>
+              <a:ext uri="{FF2B5EF4-FFF2-40B4-BE49-F238E27FC236}">
+                <a16:creationId xmlns:a16="http://schemas.microsoft.com/office/drawing/2014/main" id="{FB8057E8-81B8-1F42-9B24-571399DB53E8}"/>
+              </a:ext>
+            </a:extLst>
+          </p:cNvPr>
+          <p:cNvSpPr/>
+          <p:nvPr/>
+        </p:nvSpPr>
+        <p:spPr>
+          <a:xfrm>
+            <a:off x="6401391" y="1245439"/>
+            <a:ext cx="432484" cy="2183561"/>
+          </a:xfrm>
+          <a:prstGeom prst="rect">
+            <a:avLst/>
+          </a:prstGeom>
+          <a:solidFill>
+            <a:srgbClr val="00B621"/>
+          </a:solidFill>
+          <a:ln>
+            <a:noFill/>
+          </a:ln>
+          <a:effectLst/>
+        </p:spPr>
+        <p:style>
+          <a:lnRef idx="2">
+            <a:schemeClr val="accent1">
+              <a:shade val="50000"/>
+            </a:schemeClr>
+          </a:lnRef>
+          <a:fillRef idx="1">
+            <a:schemeClr val="accent1"/>
+          </a:fillRef>
+          <a:effectRef idx="0">
+            <a:schemeClr val="accent1"/>
+          </a:effectRef>
+          <a:fontRef idx="minor">
+            <a:schemeClr val="lt1"/>
+          </a:fontRef>
+        </p:style>
+        <p:txBody>
+          <a:bodyPr rtlCol="0" anchor="ctr"/>
+          <a:lstStyle/>
+          <a:p>
+            <a:pPr algn="ctr"/>
+            <a:endParaRPr lang="en-US"/>
+          </a:p>
+        </p:txBody>
+      </p:sp>
+      <p:sp>
+        <p:nvSpPr>
+          <p:cNvPr id="19" name="Parallelogram 18">
+            <a:extLst>
+              <a:ext uri="{FF2B5EF4-FFF2-40B4-BE49-F238E27FC236}">
+                <a16:creationId xmlns:a16="http://schemas.microsoft.com/office/drawing/2014/main" id="{F66D7793-8322-8842-B4F2-D33820E70762}"/>
+              </a:ext>
+            </a:extLst>
+          </p:cNvPr>
+          <p:cNvSpPr/>
+          <p:nvPr/>
+        </p:nvSpPr>
+        <p:spPr>
+          <a:xfrm flipV="1">
+            <a:off x="6833875" y="2676942"/>
+            <a:ext cx="1122620" cy="752058"/>
+          </a:xfrm>
+          <a:prstGeom prst="parallelogram">
+            <a:avLst>
+              <a:gd name="adj" fmla="val 85659"/>
+            </a:avLst>
+          </a:prstGeom>
+          <a:solidFill>
+            <a:srgbClr val="0094FF"/>
+          </a:solidFill>
+          <a:ln>
+            <a:noFill/>
+          </a:ln>
+          <a:effectLst/>
+        </p:spPr>
+        <p:style>
+          <a:lnRef idx="2">
+            <a:schemeClr val="accent1">
+              <a:shade val="50000"/>
+            </a:schemeClr>
+          </a:lnRef>
+          <a:fillRef idx="1">
+            <a:schemeClr val="accent1"/>
+          </a:fillRef>
+          <a:effectRef idx="0">
+            <a:schemeClr val="accent1"/>
+          </a:effectRef>
+          <a:fontRef idx="minor">
+            <a:schemeClr val="lt1"/>
+          </a:fontRef>
+        </p:style>
+        <p:txBody>
+          <a:bodyPr rtlCol="0" anchor="ctr"/>
+          <a:lstStyle/>
+          <a:p>
+            <a:pPr algn="ctr"/>
+            <a:endParaRPr lang="en-US"/>
+          </a:p>
+        </p:txBody>
+      </p:sp>
+      <p:sp>
+        <p:nvSpPr>
+          <p:cNvPr id="18" name="Parallelogram 17">
+            <a:extLst>
+              <a:ext uri="{FF2B5EF4-FFF2-40B4-BE49-F238E27FC236}">
+                <a16:creationId xmlns:a16="http://schemas.microsoft.com/office/drawing/2014/main" id="{F583D836-B8DA-094D-98B1-30DF81B29248}"/>
+              </a:ext>
+            </a:extLst>
+          </p:cNvPr>
+          <p:cNvSpPr/>
+          <p:nvPr/>
+        </p:nvSpPr>
+        <p:spPr>
+          <a:xfrm>
+            <a:off x="6833875" y="1924884"/>
+            <a:ext cx="1112110" cy="752058"/>
+          </a:xfrm>
+          <a:prstGeom prst="parallelogram">
+            <a:avLst>
+              <a:gd name="adj" fmla="val 84016"/>
+            </a:avLst>
+          </a:prstGeom>
+          <a:solidFill>
+            <a:srgbClr val="FF0000"/>
+          </a:solidFill>
+          <a:ln>
+            <a:noFill/>
+          </a:ln>
+          <a:effectLst/>
+        </p:spPr>
+        <p:style>
+          <a:lnRef idx="2">
+            <a:schemeClr val="accent1">
+              <a:shade val="50000"/>
+            </a:schemeClr>
+          </a:lnRef>
+          <a:fillRef idx="1">
+            <a:schemeClr val="accent1"/>
+          </a:fillRef>
+          <a:effectRef idx="0">
+            <a:schemeClr val="accent1"/>
+          </a:effectRef>
+          <a:fontRef idx="minor">
+            <a:schemeClr val="lt1"/>
+          </a:fontRef>
+        </p:style>
+        <p:txBody>
+          <a:bodyPr rtlCol="0" anchor="ctr"/>
+          <a:lstStyle/>
+          <a:p>
+            <a:pPr algn="ctr"/>
+            <a:endParaRPr lang="en-US"/>
+          </a:p>
+        </p:txBody>
+      </p:sp>
+      <p:sp>
+        <p:nvSpPr>
+          <p:cNvPr id="7" name="Rectangle 6">
+            <a:extLst>
+              <a:ext uri="{FF2B5EF4-FFF2-40B4-BE49-F238E27FC236}">
+                <a16:creationId xmlns:a16="http://schemas.microsoft.com/office/drawing/2014/main" id="{7D972B0C-E026-E34A-9E8B-0DAB5356C6DD}"/>
+              </a:ext>
+            </a:extLst>
+          </p:cNvPr>
+          <p:cNvSpPr/>
+          <p:nvPr/>
+        </p:nvSpPr>
+        <p:spPr>
+          <a:xfrm>
+            <a:off x="5505063" y="765111"/>
+            <a:ext cx="3247054" cy="3247054"/>
+          </a:xfrm>
+          <a:prstGeom prst="rect">
+            <a:avLst/>
+          </a:prstGeom>
+          <a:noFill/>
+          <a:ln>
+            <a:noFill/>
+          </a:ln>
+        </p:spPr>
+        <p:style>
+          <a:lnRef idx="2">
+            <a:schemeClr val="dk1"/>
+          </a:lnRef>
+          <a:fillRef idx="1">
+            <a:schemeClr val="lt1"/>
+          </a:fillRef>
+          <a:effectRef idx="0">
+            <a:schemeClr val="dk1"/>
+          </a:effectRef>
+          <a:fontRef idx="minor">
+            <a:schemeClr val="dk1"/>
+          </a:fontRef>
+        </p:style>
+        <p:txBody>
+          <a:bodyPr rtlCol="0" anchor="ctr"/>
+          <a:lstStyle/>
+          <a:p>
+            <a:pPr algn="ctr"/>
+            <a:endParaRPr lang="fr-CA"/>
+          </a:p>
+        </p:txBody>
+      </p:sp>
+    </p:spTree>
+    <p:extLst>
+      <p:ext uri="{BB962C8B-B14F-4D97-AF65-F5344CB8AC3E}">
+        <p14:creationId xmlns:p14="http://schemas.microsoft.com/office/powerpoint/2010/main" val="1310026250"/>
       </p:ext>
     </p:extLst>
   </p:cSld>

</xml_diff>